<commit_message>
Presentation is refined... Still need a couple pics
</commit_message>
<xml_diff>
--- a/Crowds_YannLindseyJoe.pptx
+++ b/Crowds_YannLindseyJoe.pptx
@@ -6,15 +6,20 @@
   </p:sldMasterIdLst>
   <p:sldIdLst>
     <p:sldId id="256" r:id="rId2"/>
-    <p:sldId id="257" r:id="rId3"/>
-    <p:sldId id="258" r:id="rId4"/>
-    <p:sldId id="259" r:id="rId5"/>
-    <p:sldId id="260" r:id="rId6"/>
-    <p:sldId id="261" r:id="rId7"/>
-    <p:sldId id="262" r:id="rId8"/>
-    <p:sldId id="263" r:id="rId9"/>
-    <p:sldId id="264" r:id="rId10"/>
-    <p:sldId id="265" r:id="rId11"/>
+    <p:sldId id="267" r:id="rId3"/>
+    <p:sldId id="257" r:id="rId4"/>
+    <p:sldId id="258" r:id="rId5"/>
+    <p:sldId id="259" r:id="rId6"/>
+    <p:sldId id="260" r:id="rId7"/>
+    <p:sldId id="261" r:id="rId8"/>
+    <p:sldId id="262" r:id="rId9"/>
+    <p:sldId id="263" r:id="rId10"/>
+    <p:sldId id="264" r:id="rId11"/>
+    <p:sldId id="266" r:id="rId12"/>
+    <p:sldId id="268" r:id="rId13"/>
+    <p:sldId id="269" r:id="rId14"/>
+    <p:sldId id="270" r:id="rId15"/>
+    <p:sldId id="265" r:id="rId16"/>
   </p:sldIdLst>
   <p:sldSz cx="9144000" cy="6858000" type="screen4x3"/>
   <p:notesSz cx="6858000" cy="9144000"/>
@@ -116,6 +121,1290 @@
 </p:presentation>
 </file>
 
+<file path=ppt/charts/chart1.xml><?xml version="1.0" encoding="utf-8"?>
+<c:chartSpace xmlns:c="http://schemas.openxmlformats.org/drawingml/2006/chart" xmlns:a="http://schemas.openxmlformats.org/drawingml/2006/main" xmlns:r="http://schemas.openxmlformats.org/officeDocument/2006/relationships">
+  <c:date1904 val="0"/>
+  <c:lang val="en-US"/>
+  <c:roundedCorners val="0"/>
+  <mc:AlternateContent xmlns:mc="http://schemas.openxmlformats.org/markup-compatibility/2006">
+    <mc:Choice xmlns:c14="http://schemas.microsoft.com/office/drawing/2007/8/2/chart" Requires="c14">
+      <c14:style val="102"/>
+    </mc:Choice>
+    <mc:Fallback>
+      <c:style val="2"/>
+    </mc:Fallback>
+  </mc:AlternateContent>
+  <c:chart>
+    <c:autoTitleDeleted val="0"/>
+    <c:view3D>
+      <c:rotX val="15"/>
+      <c:rotY val="310"/>
+      <c:rAngAx val="0"/>
+      <c:perspective val="30"/>
+    </c:view3D>
+    <c:floor>
+      <c:thickness val="0"/>
+    </c:floor>
+    <c:sideWall>
+      <c:thickness val="0"/>
+    </c:sideWall>
+    <c:backWall>
+      <c:thickness val="0"/>
+    </c:backWall>
+    <c:plotArea>
+      <c:layout/>
+      <c:surface3DChart>
+        <c:wireframe val="0"/>
+        <c:ser>
+          <c:idx val="0"/>
+          <c:order val="0"/>
+          <c:tx>
+            <c:strRef>
+              <c:f>Sheet1!$A$6</c:f>
+              <c:strCache>
+                <c:ptCount val="1"/>
+                <c:pt idx="0">
+                  <c:v>Pf = 0.6</c:v>
+                </c:pt>
+              </c:strCache>
+            </c:strRef>
+          </c:tx>
+          <c:val>
+            <c:numRef>
+              <c:f>Sheet1!$B$6:$L$6</c:f>
+              <c:numCache>
+                <c:formatCode>General</c:formatCode>
+                <c:ptCount val="11"/>
+                <c:pt idx="0">
+                  <c:v>0.6</c:v>
+                </c:pt>
+                <c:pt idx="1">
+                  <c:v>-26.000000000000007</c:v>
+                </c:pt>
+                <c:pt idx="2">
+                  <c:v>-16.000000000000007</c:v>
+                </c:pt>
+                <c:pt idx="3">
+                  <c:v>-6.0000000000000071</c:v>
+                </c:pt>
+                <c:pt idx="4">
+                  <c:v>3.9999999999999929</c:v>
+                </c:pt>
+                <c:pt idx="5">
+                  <c:v>13.999999999999993</c:v>
+                </c:pt>
+                <c:pt idx="6">
+                  <c:v>23.999999999999993</c:v>
+                </c:pt>
+                <c:pt idx="7">
+                  <c:v>33.999999999999993</c:v>
+                </c:pt>
+                <c:pt idx="8">
+                  <c:v>43.999999999999993</c:v>
+                </c:pt>
+                <c:pt idx="9">
+                  <c:v>53.999999999999993</c:v>
+                </c:pt>
+                <c:pt idx="10">
+                  <c:v>63.999999999999993</c:v>
+                </c:pt>
+              </c:numCache>
+            </c:numRef>
+          </c:val>
+        </c:ser>
+        <c:ser>
+          <c:idx val="1"/>
+          <c:order val="1"/>
+          <c:tx>
+            <c:strRef>
+              <c:f>Sheet1!$A$7</c:f>
+              <c:strCache>
+                <c:ptCount val="1"/>
+                <c:pt idx="0">
+                  <c:v>Pf = 0.7</c:v>
+                </c:pt>
+              </c:strCache>
+            </c:strRef>
+          </c:tx>
+          <c:val>
+            <c:numRef>
+              <c:f>Sheet1!$B$7:$L$7</c:f>
+              <c:numCache>
+                <c:formatCode>General</c:formatCode>
+                <c:ptCount val="11"/>
+                <c:pt idx="0">
+                  <c:v>0.7</c:v>
+                </c:pt>
+                <c:pt idx="1">
+                  <c:v>-11.000000000000004</c:v>
+                </c:pt>
+                <c:pt idx="2">
+                  <c:v>-1.0000000000000036</c:v>
+                </c:pt>
+                <c:pt idx="3">
+                  <c:v>8.9999999999999964</c:v>
+                </c:pt>
+                <c:pt idx="4">
+                  <c:v>18.999999999999996</c:v>
+                </c:pt>
+                <c:pt idx="5">
+                  <c:v>28.999999999999996</c:v>
+                </c:pt>
+                <c:pt idx="6">
+                  <c:v>39</c:v>
+                </c:pt>
+                <c:pt idx="7">
+                  <c:v>49</c:v>
+                </c:pt>
+                <c:pt idx="8">
+                  <c:v>59</c:v>
+                </c:pt>
+                <c:pt idx="9">
+                  <c:v>69</c:v>
+                </c:pt>
+                <c:pt idx="10">
+                  <c:v>79</c:v>
+                </c:pt>
+              </c:numCache>
+            </c:numRef>
+          </c:val>
+        </c:ser>
+        <c:ser>
+          <c:idx val="2"/>
+          <c:order val="2"/>
+          <c:tx>
+            <c:strRef>
+              <c:f>Sheet1!$A$8</c:f>
+              <c:strCache>
+                <c:ptCount val="1"/>
+                <c:pt idx="0">
+                  <c:v>Pf = 0.8</c:v>
+                </c:pt>
+              </c:strCache>
+            </c:strRef>
+          </c:tx>
+          <c:val>
+            <c:numRef>
+              <c:f>Sheet1!$B$8:$L$8</c:f>
+              <c:numCache>
+                <c:formatCode>General</c:formatCode>
+                <c:ptCount val="11"/>
+                <c:pt idx="0">
+                  <c:v>0.8</c:v>
+                </c:pt>
+                <c:pt idx="1">
+                  <c:v>-6</c:v>
+                </c:pt>
+                <c:pt idx="2">
+                  <c:v>4</c:v>
+                </c:pt>
+                <c:pt idx="3">
+                  <c:v>14</c:v>
+                </c:pt>
+                <c:pt idx="4">
+                  <c:v>24</c:v>
+                </c:pt>
+                <c:pt idx="5">
+                  <c:v>34</c:v>
+                </c:pt>
+                <c:pt idx="6">
+                  <c:v>44</c:v>
+                </c:pt>
+                <c:pt idx="7">
+                  <c:v>54</c:v>
+                </c:pt>
+                <c:pt idx="8">
+                  <c:v>64</c:v>
+                </c:pt>
+                <c:pt idx="9">
+                  <c:v>74</c:v>
+                </c:pt>
+                <c:pt idx="10">
+                  <c:v>84</c:v>
+                </c:pt>
+              </c:numCache>
+            </c:numRef>
+          </c:val>
+        </c:ser>
+        <c:ser>
+          <c:idx val="3"/>
+          <c:order val="3"/>
+          <c:tx>
+            <c:strRef>
+              <c:f>Sheet1!$A$9</c:f>
+              <c:strCache>
+                <c:ptCount val="1"/>
+                <c:pt idx="0">
+                  <c:v>Pf = 0.9</c:v>
+                </c:pt>
+              </c:strCache>
+            </c:strRef>
+          </c:tx>
+          <c:val>
+            <c:numRef>
+              <c:f>Sheet1!$B$9:$L$9</c:f>
+              <c:numCache>
+                <c:formatCode>General</c:formatCode>
+                <c:ptCount val="11"/>
+                <c:pt idx="0">
+                  <c:v>0.9</c:v>
+                </c:pt>
+                <c:pt idx="1">
+                  <c:v>-3.5</c:v>
+                </c:pt>
+                <c:pt idx="2">
+                  <c:v>6.5</c:v>
+                </c:pt>
+                <c:pt idx="3">
+                  <c:v>16.5</c:v>
+                </c:pt>
+                <c:pt idx="4">
+                  <c:v>26.5</c:v>
+                </c:pt>
+                <c:pt idx="5">
+                  <c:v>36.5</c:v>
+                </c:pt>
+                <c:pt idx="6">
+                  <c:v>46.5</c:v>
+                </c:pt>
+                <c:pt idx="7">
+                  <c:v>56.5</c:v>
+                </c:pt>
+                <c:pt idx="8">
+                  <c:v>66.5</c:v>
+                </c:pt>
+                <c:pt idx="9">
+                  <c:v>76.5</c:v>
+                </c:pt>
+                <c:pt idx="10">
+                  <c:v>86.5</c:v>
+                </c:pt>
+              </c:numCache>
+            </c:numRef>
+          </c:val>
+        </c:ser>
+        <c:bandFmts/>
+        <c:axId val="48226688"/>
+        <c:axId val="48228224"/>
+        <c:axId val="46642496"/>
+      </c:surface3DChart>
+      <c:catAx>
+        <c:axId val="48226688"/>
+        <c:scaling>
+          <c:orientation val="minMax"/>
+        </c:scaling>
+        <c:delete val="0"/>
+        <c:axPos val="b"/>
+        <c:majorTickMark val="out"/>
+        <c:minorTickMark val="none"/>
+        <c:tickLblPos val="nextTo"/>
+        <c:crossAx val="48228224"/>
+        <c:crosses val="autoZero"/>
+        <c:auto val="1"/>
+        <c:lblAlgn val="ctr"/>
+        <c:lblOffset val="100"/>
+        <c:noMultiLvlLbl val="0"/>
+      </c:catAx>
+      <c:valAx>
+        <c:axId val="48228224"/>
+        <c:scaling>
+          <c:orientation val="minMax"/>
+        </c:scaling>
+        <c:delete val="0"/>
+        <c:axPos val="l"/>
+        <c:majorGridlines/>
+        <c:numFmt formatCode="General" sourceLinked="1"/>
+        <c:majorTickMark val="out"/>
+        <c:minorTickMark val="none"/>
+        <c:tickLblPos val="nextTo"/>
+        <c:crossAx val="48226688"/>
+        <c:crosses val="autoZero"/>
+        <c:crossBetween val="midCat"/>
+      </c:valAx>
+      <c:serAx>
+        <c:axId val="46642496"/>
+        <c:scaling>
+          <c:orientation val="minMax"/>
+        </c:scaling>
+        <c:delete val="0"/>
+        <c:axPos val="b"/>
+        <c:majorTickMark val="out"/>
+        <c:minorTickMark val="none"/>
+        <c:tickLblPos val="nextTo"/>
+        <c:crossAx val="48228224"/>
+        <c:crosses val="autoZero"/>
+      </c:serAx>
+    </c:plotArea>
+    <c:legend>
+      <c:legendPos val="r"/>
+      <c:layout/>
+      <c:overlay val="0"/>
+      <c:txPr>
+        <a:bodyPr/>
+        <a:lstStyle/>
+        <a:p>
+          <a:pPr rtl="0">
+            <a:defRPr/>
+          </a:pPr>
+          <a:endParaRPr lang="en-US"/>
+        </a:p>
+      </c:txPr>
+    </c:legend>
+    <c:plotVisOnly val="1"/>
+    <c:dispBlanksAs val="zero"/>
+    <c:showDLblsOverMax val="0"/>
+  </c:chart>
+  <c:externalData r:id="rId1">
+    <c:autoUpdate val="0"/>
+  </c:externalData>
+</c:chartSpace>
+</file>
+
+<file path=ppt/charts/chart2.xml><?xml version="1.0" encoding="utf-8"?>
+<c:chartSpace xmlns:c="http://schemas.openxmlformats.org/drawingml/2006/chart" xmlns:a="http://schemas.openxmlformats.org/drawingml/2006/main" xmlns:r="http://schemas.openxmlformats.org/officeDocument/2006/relationships">
+  <c:date1904 val="0"/>
+  <c:lang val="en-US"/>
+  <c:roundedCorners val="0"/>
+  <mc:AlternateContent xmlns:mc="http://schemas.openxmlformats.org/markup-compatibility/2006">
+    <mc:Choice xmlns:c14="http://schemas.microsoft.com/office/drawing/2007/8/2/chart" Requires="c14">
+      <c14:style val="102"/>
+    </mc:Choice>
+    <mc:Fallback>
+      <c:style val="2"/>
+    </mc:Fallback>
+  </mc:AlternateContent>
+  <c:chart>
+    <c:title>
+      <c:tx>
+        <c:rich>
+          <a:bodyPr/>
+          <a:lstStyle/>
+          <a:p>
+            <a:pPr>
+              <a:defRPr/>
+            </a:pPr>
+            <a:r>
+              <a:rPr lang="en-US"/>
+              <a:t>Performance vs. Innocence (crowd size) Pf = 0.75 Attackers = 1/5</a:t>
+            </a:r>
+          </a:p>
+        </c:rich>
+      </c:tx>
+      <c:layout/>
+      <c:overlay val="0"/>
+    </c:title>
+    <c:autoTitleDeleted val="0"/>
+    <c:plotArea>
+      <c:layout/>
+      <c:scatterChart>
+        <c:scatterStyle val="lineMarker"/>
+        <c:varyColors val="0"/>
+        <c:ser>
+          <c:idx val="0"/>
+          <c:order val="0"/>
+          <c:xVal>
+            <c:numRef>
+              <c:f>Sheet2!$B$2:$B$20</c:f>
+              <c:numCache>
+                <c:formatCode>General</c:formatCode>
+                <c:ptCount val="19"/>
+                <c:pt idx="0">
+                  <c:v>1</c:v>
+                </c:pt>
+                <c:pt idx="1">
+                  <c:v>3</c:v>
+                </c:pt>
+                <c:pt idx="2">
+                  <c:v>5</c:v>
+                </c:pt>
+                <c:pt idx="3">
+                  <c:v>7</c:v>
+                </c:pt>
+                <c:pt idx="4">
+                  <c:v>9</c:v>
+                </c:pt>
+                <c:pt idx="5">
+                  <c:v>11</c:v>
+                </c:pt>
+                <c:pt idx="6">
+                  <c:v>13</c:v>
+                </c:pt>
+                <c:pt idx="7">
+                  <c:v>15</c:v>
+                </c:pt>
+                <c:pt idx="8">
+                  <c:v>17</c:v>
+                </c:pt>
+                <c:pt idx="9">
+                  <c:v>19</c:v>
+                </c:pt>
+                <c:pt idx="10">
+                  <c:v>21</c:v>
+                </c:pt>
+                <c:pt idx="11">
+                  <c:v>23</c:v>
+                </c:pt>
+                <c:pt idx="12">
+                  <c:v>25</c:v>
+                </c:pt>
+                <c:pt idx="13">
+                  <c:v>27</c:v>
+                </c:pt>
+                <c:pt idx="14">
+                  <c:v>29</c:v>
+                </c:pt>
+                <c:pt idx="15">
+                  <c:v>31</c:v>
+                </c:pt>
+                <c:pt idx="16">
+                  <c:v>33</c:v>
+                </c:pt>
+                <c:pt idx="17">
+                  <c:v>35</c:v>
+                </c:pt>
+                <c:pt idx="18">
+                  <c:v>37</c:v>
+                </c:pt>
+              </c:numCache>
+            </c:numRef>
+          </c:xVal>
+          <c:yVal>
+            <c:numRef>
+              <c:f>Sheet2!$C$2:$C$20</c:f>
+              <c:numCache>
+                <c:formatCode>General</c:formatCode>
+                <c:ptCount val="19"/>
+                <c:pt idx="0">
+                  <c:v>234.887555827168</c:v>
+                </c:pt>
+                <c:pt idx="1">
+                  <c:v>300.09226946080202</c:v>
+                </c:pt>
+                <c:pt idx="2">
+                  <c:v>527.17279560394195</c:v>
+                </c:pt>
+                <c:pt idx="3">
+                  <c:v>518.97187625008996</c:v>
+                </c:pt>
+                <c:pt idx="4">
+                  <c:v>614.62063464579603</c:v>
+                </c:pt>
+                <c:pt idx="5">
+                  <c:v>730.24311386033901</c:v>
+                </c:pt>
+                <c:pt idx="6">
+                  <c:v>731.552213052051</c:v>
+                </c:pt>
+                <c:pt idx="7">
+                  <c:v>909.49378032422305</c:v>
+                </c:pt>
+                <c:pt idx="8">
+                  <c:v>888.14641975565803</c:v>
+                </c:pt>
+                <c:pt idx="9">
+                  <c:v>1052.26862327344</c:v>
+                </c:pt>
+                <c:pt idx="10">
+                  <c:v>1068.54161881147</c:v>
+                </c:pt>
+                <c:pt idx="11">
+                  <c:v>1153.79252022132</c:v>
+                </c:pt>
+                <c:pt idx="12">
+                  <c:v>1252.15792437299</c:v>
+                </c:pt>
+                <c:pt idx="13">
+                  <c:v>1314.66751784647</c:v>
+                </c:pt>
+                <c:pt idx="14">
+                  <c:v>1403.0899566597</c:v>
+                </c:pt>
+                <c:pt idx="15">
+                  <c:v>1503.73078321773</c:v>
+                </c:pt>
+                <c:pt idx="16">
+                  <c:v>1582.97664306315</c:v>
+                </c:pt>
+                <c:pt idx="17">
+                  <c:v>1680.36618301925</c:v>
+                </c:pt>
+                <c:pt idx="18">
+                  <c:v>1766.56582545266</c:v>
+                </c:pt>
+              </c:numCache>
+            </c:numRef>
+          </c:yVal>
+          <c:smooth val="0"/>
+        </c:ser>
+        <c:dLbls>
+          <c:showLegendKey val="0"/>
+          <c:showVal val="0"/>
+          <c:showCatName val="0"/>
+          <c:showSerName val="0"/>
+          <c:showPercent val="0"/>
+          <c:showBubbleSize val="0"/>
+        </c:dLbls>
+        <c:axId val="48306816"/>
+        <c:axId val="85712896"/>
+      </c:scatterChart>
+      <c:valAx>
+        <c:axId val="48306816"/>
+        <c:scaling>
+          <c:orientation val="minMax"/>
+        </c:scaling>
+        <c:delete val="0"/>
+        <c:axPos val="b"/>
+        <c:title>
+          <c:tx>
+            <c:rich>
+              <a:bodyPr/>
+              <a:lstStyle/>
+              <a:p>
+                <a:pPr>
+                  <a:defRPr/>
+                </a:pPr>
+                <a:r>
+                  <a:rPr lang="en-US"/>
+                  <a:t>Probable Innocence</a:t>
+                </a:r>
+              </a:p>
+            </c:rich>
+          </c:tx>
+          <c:layout/>
+          <c:overlay val="0"/>
+        </c:title>
+        <c:numFmt formatCode="General" sourceLinked="1"/>
+        <c:majorTickMark val="none"/>
+        <c:minorTickMark val="none"/>
+        <c:tickLblPos val="nextTo"/>
+        <c:crossAx val="85712896"/>
+        <c:crosses val="autoZero"/>
+        <c:crossBetween val="midCat"/>
+      </c:valAx>
+      <c:valAx>
+        <c:axId val="85712896"/>
+        <c:scaling>
+          <c:orientation val="minMax"/>
+        </c:scaling>
+        <c:delete val="0"/>
+        <c:axPos val="l"/>
+        <c:majorGridlines/>
+        <c:title>
+          <c:tx>
+            <c:rich>
+              <a:bodyPr/>
+              <a:lstStyle/>
+              <a:p>
+                <a:pPr>
+                  <a:defRPr/>
+                </a:pPr>
+                <a:r>
+                  <a:rPr lang="en-US"/>
+                  <a:t>Average</a:t>
+                </a:r>
+                <a:r>
+                  <a:rPr lang="en-US" baseline="0"/>
+                  <a:t> Response Time</a:t>
+                </a:r>
+                <a:endParaRPr lang="en-US"/>
+              </a:p>
+            </c:rich>
+          </c:tx>
+          <c:layout/>
+          <c:overlay val="0"/>
+        </c:title>
+        <c:numFmt formatCode="General" sourceLinked="1"/>
+        <c:majorTickMark val="none"/>
+        <c:minorTickMark val="none"/>
+        <c:tickLblPos val="nextTo"/>
+        <c:crossAx val="48306816"/>
+        <c:crosses val="autoZero"/>
+        <c:crossBetween val="midCat"/>
+      </c:valAx>
+    </c:plotArea>
+    <c:plotVisOnly val="1"/>
+    <c:dispBlanksAs val="gap"/>
+    <c:showDLblsOverMax val="0"/>
+  </c:chart>
+  <c:externalData r:id="rId1">
+    <c:autoUpdate val="0"/>
+  </c:externalData>
+</c:chartSpace>
+</file>
+
+<file path=ppt/charts/chart3.xml><?xml version="1.0" encoding="utf-8"?>
+<c:chartSpace xmlns:c="http://schemas.openxmlformats.org/drawingml/2006/chart" xmlns:a="http://schemas.openxmlformats.org/drawingml/2006/main" xmlns:r="http://schemas.openxmlformats.org/officeDocument/2006/relationships">
+  <c:date1904 val="0"/>
+  <c:lang val="en-US"/>
+  <c:roundedCorners val="0"/>
+  <mc:AlternateContent xmlns:mc="http://schemas.openxmlformats.org/markup-compatibility/2006">
+    <mc:Choice xmlns:c14="http://schemas.microsoft.com/office/drawing/2007/8/2/chart" Requires="c14">
+      <c14:style val="102"/>
+    </mc:Choice>
+    <mc:Fallback>
+      <c:style val="2"/>
+    </mc:Fallback>
+  </mc:AlternateContent>
+  <c:chart>
+    <c:title>
+      <c:tx>
+        <c:rich>
+          <a:bodyPr/>
+          <a:lstStyle/>
+          <a:p>
+            <a:pPr>
+              <a:defRPr/>
+            </a:pPr>
+            <a:r>
+              <a:rPr lang="en-US" sz="1600"/>
+              <a:t>Performance vs. Innocence (probability</a:t>
+            </a:r>
+            <a:r>
+              <a:rPr lang="en-US" sz="1600" baseline="0"/>
+              <a:t> of forwarding) jondos = 32 attackers = 7</a:t>
+            </a:r>
+            <a:endParaRPr lang="en-US" sz="1600"/>
+          </a:p>
+        </c:rich>
+      </c:tx>
+      <c:layout>
+        <c:manualLayout>
+          <c:xMode val="edge"/>
+          <c:yMode val="edge"/>
+          <c:x val="9.5986001749781266E-2"/>
+          <c:y val="4.1666666666666664E-2"/>
+        </c:manualLayout>
+      </c:layout>
+      <c:overlay val="0"/>
+    </c:title>
+    <c:autoTitleDeleted val="0"/>
+    <c:plotArea>
+      <c:layout/>
+      <c:scatterChart>
+        <c:scatterStyle val="lineMarker"/>
+        <c:varyColors val="0"/>
+        <c:ser>
+          <c:idx val="2"/>
+          <c:order val="1"/>
+          <c:xVal>
+            <c:numRef>
+              <c:f>Sheet2!$B$23:$B$28</c:f>
+              <c:numCache>
+                <c:formatCode>General</c:formatCode>
+                <c:ptCount val="6"/>
+                <c:pt idx="0">
+                  <c:v>-16</c:v>
+                </c:pt>
+                <c:pt idx="1">
+                  <c:v>-2.6666666666666599</c:v>
+                </c:pt>
+                <c:pt idx="2">
+                  <c:v>4</c:v>
+                </c:pt>
+                <c:pt idx="3">
+                  <c:v>8</c:v>
+                </c:pt>
+                <c:pt idx="4">
+                  <c:v>10.6666666666666</c:v>
+                </c:pt>
+                <c:pt idx="5">
+                  <c:v>12.5714285714285</c:v>
+                </c:pt>
+              </c:numCache>
+            </c:numRef>
+          </c:xVal>
+          <c:yVal>
+            <c:numRef>
+              <c:f>Sheet2!$C$23:$C$28</c:f>
+              <c:numCache>
+                <c:formatCode>General</c:formatCode>
+                <c:ptCount val="6"/>
+                <c:pt idx="0">
+                  <c:v>498.85637616515902</c:v>
+                </c:pt>
+                <c:pt idx="1">
+                  <c:v>509.47696695855899</c:v>
+                </c:pt>
+                <c:pt idx="2">
+                  <c:v>513.21144835816301</c:v>
+                </c:pt>
+                <c:pt idx="3">
+                  <c:v>590.06929043693799</c:v>
+                </c:pt>
+                <c:pt idx="4">
+                  <c:v>870.84523674405</c:v>
+                </c:pt>
+                <c:pt idx="5">
+                  <c:v>847.53073067973503</c:v>
+                </c:pt>
+              </c:numCache>
+            </c:numRef>
+          </c:yVal>
+          <c:smooth val="0"/>
+        </c:ser>
+        <c:ser>
+          <c:idx val="0"/>
+          <c:order val="0"/>
+          <c:xVal>
+            <c:numRef>
+              <c:f>Sheet2!$B$23:$B$28</c:f>
+              <c:numCache>
+                <c:formatCode>General</c:formatCode>
+                <c:ptCount val="6"/>
+                <c:pt idx="0">
+                  <c:v>-16</c:v>
+                </c:pt>
+                <c:pt idx="1">
+                  <c:v>-2.6666666666666599</c:v>
+                </c:pt>
+                <c:pt idx="2">
+                  <c:v>4</c:v>
+                </c:pt>
+                <c:pt idx="3">
+                  <c:v>8</c:v>
+                </c:pt>
+                <c:pt idx="4">
+                  <c:v>10.6666666666666</c:v>
+                </c:pt>
+                <c:pt idx="5">
+                  <c:v>12.5714285714285</c:v>
+                </c:pt>
+              </c:numCache>
+            </c:numRef>
+          </c:xVal>
+          <c:yVal>
+            <c:numRef>
+              <c:f>Sheet2!$C$23:$C$28</c:f>
+              <c:numCache>
+                <c:formatCode>General</c:formatCode>
+                <c:ptCount val="6"/>
+                <c:pt idx="0">
+                  <c:v>498.85637616515902</c:v>
+                </c:pt>
+                <c:pt idx="1">
+                  <c:v>509.47696695855899</c:v>
+                </c:pt>
+                <c:pt idx="2">
+                  <c:v>513.21144835816301</c:v>
+                </c:pt>
+                <c:pt idx="3">
+                  <c:v>590.06929043693799</c:v>
+                </c:pt>
+                <c:pt idx="4">
+                  <c:v>870.84523674405</c:v>
+                </c:pt>
+                <c:pt idx="5">
+                  <c:v>847.53073067973503</c:v>
+                </c:pt>
+              </c:numCache>
+            </c:numRef>
+          </c:yVal>
+          <c:smooth val="0"/>
+        </c:ser>
+        <c:dLbls>
+          <c:showLegendKey val="0"/>
+          <c:showVal val="0"/>
+          <c:showCatName val="0"/>
+          <c:showSerName val="0"/>
+          <c:showPercent val="0"/>
+          <c:showBubbleSize val="0"/>
+        </c:dLbls>
+        <c:axId val="48808704"/>
+        <c:axId val="48810624"/>
+      </c:scatterChart>
+      <c:valAx>
+        <c:axId val="48808704"/>
+        <c:scaling>
+          <c:orientation val="minMax"/>
+        </c:scaling>
+        <c:delete val="0"/>
+        <c:axPos val="b"/>
+        <c:title>
+          <c:layout/>
+          <c:overlay val="0"/>
+        </c:title>
+        <c:numFmt formatCode="General" sourceLinked="1"/>
+        <c:majorTickMark val="none"/>
+        <c:minorTickMark val="none"/>
+        <c:tickLblPos val="nextTo"/>
+        <c:crossAx val="48810624"/>
+        <c:crosses val="autoZero"/>
+        <c:crossBetween val="midCat"/>
+      </c:valAx>
+      <c:valAx>
+        <c:axId val="48810624"/>
+        <c:scaling>
+          <c:orientation val="minMax"/>
+        </c:scaling>
+        <c:delete val="0"/>
+        <c:axPos val="l"/>
+        <c:majorGridlines/>
+        <c:title>
+          <c:layout/>
+          <c:overlay val="0"/>
+        </c:title>
+        <c:numFmt formatCode="General" sourceLinked="1"/>
+        <c:majorTickMark val="none"/>
+        <c:minorTickMark val="none"/>
+        <c:tickLblPos val="nextTo"/>
+        <c:crossAx val="48808704"/>
+        <c:crosses val="autoZero"/>
+        <c:crossBetween val="midCat"/>
+      </c:valAx>
+    </c:plotArea>
+    <c:plotVisOnly val="1"/>
+    <c:dispBlanksAs val="gap"/>
+    <c:showDLblsOverMax val="0"/>
+  </c:chart>
+  <c:externalData r:id="rId1">
+    <c:autoUpdate val="0"/>
+  </c:externalData>
+</c:chartSpace>
+</file>
+
+<file path=ppt/charts/chart4.xml><?xml version="1.0" encoding="utf-8"?>
+<c:chartSpace xmlns:c="http://schemas.openxmlformats.org/drawingml/2006/chart" xmlns:a="http://schemas.openxmlformats.org/drawingml/2006/main" xmlns:r="http://schemas.openxmlformats.org/officeDocument/2006/relationships">
+  <c:date1904 val="0"/>
+  <c:lang val="en-US"/>
+  <c:roundedCorners val="0"/>
+  <mc:AlternateContent xmlns:mc="http://schemas.openxmlformats.org/markup-compatibility/2006">
+    <mc:Choice xmlns:c14="http://schemas.microsoft.com/office/drawing/2007/8/2/chart" Requires="c14">
+      <c14:style val="102"/>
+    </mc:Choice>
+    <mc:Fallback>
+      <c:style val="2"/>
+    </mc:Fallback>
+  </mc:AlternateContent>
+  <c:chart>
+    <c:title>
+      <c:tx>
+        <c:rich>
+          <a:bodyPr/>
+          <a:lstStyle/>
+          <a:p>
+            <a:pPr>
+              <a:defRPr/>
+            </a:pPr>
+            <a:r>
+              <a:rPr lang="en-US"/>
+              <a:t>Forwarding vs. Innocence (crowd size) Pf = 0.75 Attackers = 1/5</a:t>
+            </a:r>
+          </a:p>
+        </c:rich>
+      </c:tx>
+      <c:layout/>
+      <c:overlay val="0"/>
+    </c:title>
+    <c:autoTitleDeleted val="0"/>
+    <c:plotArea>
+      <c:layout/>
+      <c:scatterChart>
+        <c:scatterStyle val="lineMarker"/>
+        <c:varyColors val="0"/>
+        <c:ser>
+          <c:idx val="1"/>
+          <c:order val="0"/>
+          <c:xVal>
+            <c:numRef>
+              <c:f>Sheet2!$B$2:$B$20</c:f>
+              <c:numCache>
+                <c:formatCode>General</c:formatCode>
+                <c:ptCount val="19"/>
+                <c:pt idx="0">
+                  <c:v>1</c:v>
+                </c:pt>
+                <c:pt idx="1">
+                  <c:v>3</c:v>
+                </c:pt>
+                <c:pt idx="2">
+                  <c:v>5</c:v>
+                </c:pt>
+                <c:pt idx="3">
+                  <c:v>7</c:v>
+                </c:pt>
+                <c:pt idx="4">
+                  <c:v>9</c:v>
+                </c:pt>
+                <c:pt idx="5">
+                  <c:v>11</c:v>
+                </c:pt>
+                <c:pt idx="6">
+                  <c:v>13</c:v>
+                </c:pt>
+                <c:pt idx="7">
+                  <c:v>15</c:v>
+                </c:pt>
+                <c:pt idx="8">
+                  <c:v>17</c:v>
+                </c:pt>
+                <c:pt idx="9">
+                  <c:v>19</c:v>
+                </c:pt>
+                <c:pt idx="10">
+                  <c:v>21</c:v>
+                </c:pt>
+                <c:pt idx="11">
+                  <c:v>23</c:v>
+                </c:pt>
+                <c:pt idx="12">
+                  <c:v>25</c:v>
+                </c:pt>
+                <c:pt idx="13">
+                  <c:v>27</c:v>
+                </c:pt>
+                <c:pt idx="14">
+                  <c:v>29</c:v>
+                </c:pt>
+                <c:pt idx="15">
+                  <c:v>31</c:v>
+                </c:pt>
+                <c:pt idx="16">
+                  <c:v>33</c:v>
+                </c:pt>
+                <c:pt idx="17">
+                  <c:v>35</c:v>
+                </c:pt>
+                <c:pt idx="18">
+                  <c:v>37</c:v>
+                </c:pt>
+              </c:numCache>
+            </c:numRef>
+          </c:xVal>
+          <c:yVal>
+            <c:numRef>
+              <c:f>Sheet2!$D$2:$D$20</c:f>
+              <c:numCache>
+                <c:formatCode>General</c:formatCode>
+                <c:ptCount val="19"/>
+                <c:pt idx="0">
+                  <c:v>1.7</c:v>
+                </c:pt>
+                <c:pt idx="1">
+                  <c:v>1.86666666666666</c:v>
+                </c:pt>
+                <c:pt idx="2">
+                  <c:v>2.6</c:v>
+                </c:pt>
+                <c:pt idx="3">
+                  <c:v>2.8</c:v>
+                </c:pt>
+                <c:pt idx="4">
+                  <c:v>2.8333333333333299</c:v>
+                </c:pt>
+                <c:pt idx="5">
+                  <c:v>3.1714285714285699</c:v>
+                </c:pt>
+                <c:pt idx="6">
+                  <c:v>3.05</c:v>
+                </c:pt>
+                <c:pt idx="7">
+                  <c:v>3.6</c:v>
+                </c:pt>
+                <c:pt idx="8">
+                  <c:v>3.46</c:v>
+                </c:pt>
+                <c:pt idx="9">
+                  <c:v>3.4363636363636298</c:v>
+                </c:pt>
+                <c:pt idx="10">
+                  <c:v>3.5833333333333299</c:v>
+                </c:pt>
+                <c:pt idx="11">
+                  <c:v>3.7076923076922998</c:v>
+                </c:pt>
+                <c:pt idx="12">
+                  <c:v>3.6</c:v>
+                </c:pt>
+                <c:pt idx="13">
+                  <c:v>3.48</c:v>
+                </c:pt>
+                <c:pt idx="14">
+                  <c:v>3.2124999999999999</c:v>
+                </c:pt>
+                <c:pt idx="15">
+                  <c:v>3.4117647058823501</c:v>
+                </c:pt>
+                <c:pt idx="16">
+                  <c:v>3.4444444444444402</c:v>
+                </c:pt>
+                <c:pt idx="17">
+                  <c:v>3.6105263157894698</c:v>
+                </c:pt>
+                <c:pt idx="18">
+                  <c:v>3.55</c:v>
+                </c:pt>
+              </c:numCache>
+            </c:numRef>
+          </c:yVal>
+          <c:smooth val="0"/>
+        </c:ser>
+        <c:dLbls>
+          <c:showLegendKey val="0"/>
+          <c:showVal val="0"/>
+          <c:showCatName val="0"/>
+          <c:showSerName val="0"/>
+          <c:showPercent val="0"/>
+          <c:showBubbleSize val="0"/>
+        </c:dLbls>
+        <c:axId val="79147776"/>
+        <c:axId val="79149696"/>
+      </c:scatterChart>
+      <c:valAx>
+        <c:axId val="79147776"/>
+        <c:scaling>
+          <c:orientation val="minMax"/>
+        </c:scaling>
+        <c:delete val="0"/>
+        <c:axPos val="b"/>
+        <c:title>
+          <c:tx>
+            <c:rich>
+              <a:bodyPr/>
+              <a:lstStyle/>
+              <a:p>
+                <a:pPr>
+                  <a:defRPr/>
+                </a:pPr>
+                <a:r>
+                  <a:rPr lang="en-US"/>
+                  <a:t>Probable Innocence</a:t>
+                </a:r>
+              </a:p>
+            </c:rich>
+          </c:tx>
+          <c:layout/>
+          <c:overlay val="0"/>
+        </c:title>
+        <c:numFmt formatCode="General" sourceLinked="1"/>
+        <c:majorTickMark val="none"/>
+        <c:minorTickMark val="none"/>
+        <c:tickLblPos val="nextTo"/>
+        <c:crossAx val="79149696"/>
+        <c:crosses val="autoZero"/>
+        <c:crossBetween val="midCat"/>
+      </c:valAx>
+      <c:valAx>
+        <c:axId val="79149696"/>
+        <c:scaling>
+          <c:orientation val="minMax"/>
+        </c:scaling>
+        <c:delete val="0"/>
+        <c:axPos val="l"/>
+        <c:majorGridlines/>
+        <c:title>
+          <c:tx>
+            <c:rich>
+              <a:bodyPr/>
+              <a:lstStyle/>
+              <a:p>
+                <a:pPr>
+                  <a:defRPr/>
+                </a:pPr>
+                <a:r>
+                  <a:rPr lang="en-US"/>
+                  <a:t>Average</a:t>
+                </a:r>
+                <a:r>
+                  <a:rPr lang="en-US" baseline="0"/>
+                  <a:t> Response Time</a:t>
+                </a:r>
+                <a:endParaRPr lang="en-US"/>
+              </a:p>
+            </c:rich>
+          </c:tx>
+          <c:layout/>
+          <c:overlay val="0"/>
+        </c:title>
+        <c:numFmt formatCode="General" sourceLinked="1"/>
+        <c:majorTickMark val="none"/>
+        <c:minorTickMark val="none"/>
+        <c:tickLblPos val="nextTo"/>
+        <c:crossAx val="79147776"/>
+        <c:crosses val="autoZero"/>
+        <c:crossBetween val="midCat"/>
+      </c:valAx>
+    </c:plotArea>
+    <c:plotVisOnly val="1"/>
+    <c:dispBlanksAs val="gap"/>
+    <c:showDLblsOverMax val="0"/>
+  </c:chart>
+  <c:externalData r:id="rId1">
+    <c:autoUpdate val="0"/>
+  </c:externalData>
+</c:chartSpace>
+</file>
+
+<file path=ppt/charts/chart5.xml><?xml version="1.0" encoding="utf-8"?>
+<c:chartSpace xmlns:c="http://schemas.openxmlformats.org/drawingml/2006/chart" xmlns:a="http://schemas.openxmlformats.org/drawingml/2006/main" xmlns:r="http://schemas.openxmlformats.org/officeDocument/2006/relationships">
+  <c:date1904 val="0"/>
+  <c:lang val="en-US"/>
+  <c:roundedCorners val="0"/>
+  <mc:AlternateContent xmlns:mc="http://schemas.openxmlformats.org/markup-compatibility/2006">
+    <mc:Choice xmlns:c14="http://schemas.microsoft.com/office/drawing/2007/8/2/chart" Requires="c14">
+      <c14:style val="102"/>
+    </mc:Choice>
+    <mc:Fallback>
+      <c:style val="2"/>
+    </mc:Fallback>
+  </mc:AlternateContent>
+  <c:chart>
+    <c:title>
+      <c:tx>
+        <c:rich>
+          <a:bodyPr/>
+          <a:lstStyle/>
+          <a:p>
+            <a:pPr>
+              <a:defRPr/>
+            </a:pPr>
+            <a:r>
+              <a:rPr lang="en-US" sz="1600"/>
+              <a:t>Forwarding vs. Innocence (probability</a:t>
+            </a:r>
+            <a:r>
+              <a:rPr lang="en-US" sz="1600" baseline="0"/>
+              <a:t> of forwarding) jondos = 32 attackers = 7</a:t>
+            </a:r>
+            <a:endParaRPr lang="en-US" sz="1600"/>
+          </a:p>
+        </c:rich>
+      </c:tx>
+      <c:layout>
+        <c:manualLayout>
+          <c:xMode val="edge"/>
+          <c:yMode val="edge"/>
+          <c:x val="9.5986001749781266E-2"/>
+          <c:y val="4.1666666666666664E-2"/>
+        </c:manualLayout>
+      </c:layout>
+      <c:overlay val="0"/>
+    </c:title>
+    <c:autoTitleDeleted val="0"/>
+    <c:plotArea>
+      <c:layout/>
+      <c:scatterChart>
+        <c:scatterStyle val="lineMarker"/>
+        <c:varyColors val="0"/>
+        <c:ser>
+          <c:idx val="1"/>
+          <c:order val="0"/>
+          <c:xVal>
+            <c:numRef>
+              <c:f>Sheet2!$B$23:$B$28</c:f>
+              <c:numCache>
+                <c:formatCode>General</c:formatCode>
+                <c:ptCount val="6"/>
+                <c:pt idx="0">
+                  <c:v>-16</c:v>
+                </c:pt>
+                <c:pt idx="1">
+                  <c:v>-2.6666666666666599</c:v>
+                </c:pt>
+                <c:pt idx="2">
+                  <c:v>4</c:v>
+                </c:pt>
+                <c:pt idx="3">
+                  <c:v>8</c:v>
+                </c:pt>
+                <c:pt idx="4">
+                  <c:v>10.6666666666666</c:v>
+                </c:pt>
+                <c:pt idx="5">
+                  <c:v>12.5714285714285</c:v>
+                </c:pt>
+              </c:numCache>
+            </c:numRef>
+          </c:xVal>
+          <c:yVal>
+            <c:numRef>
+              <c:f>Sheet2!$D$23:$D$28</c:f>
+              <c:numCache>
+                <c:formatCode>General</c:formatCode>
+                <c:ptCount val="6"/>
+                <c:pt idx="0">
+                  <c:v>2.03125</c:v>
+                </c:pt>
+                <c:pt idx="1">
+                  <c:v>2.125</c:v>
+                </c:pt>
+                <c:pt idx="2">
+                  <c:v>2.125</c:v>
+                </c:pt>
+                <c:pt idx="3">
+                  <c:v>2.75</c:v>
+                </c:pt>
+                <c:pt idx="4">
+                  <c:v>3.3125</c:v>
+                </c:pt>
+                <c:pt idx="5">
+                  <c:v>3.78125</c:v>
+                </c:pt>
+              </c:numCache>
+            </c:numRef>
+          </c:yVal>
+          <c:smooth val="0"/>
+        </c:ser>
+        <c:dLbls>
+          <c:showLegendKey val="0"/>
+          <c:showVal val="0"/>
+          <c:showCatName val="0"/>
+          <c:showSerName val="0"/>
+          <c:showPercent val="0"/>
+          <c:showBubbleSize val="0"/>
+        </c:dLbls>
+        <c:axId val="43457536"/>
+        <c:axId val="48764032"/>
+      </c:scatterChart>
+      <c:valAx>
+        <c:axId val="43457536"/>
+        <c:scaling>
+          <c:orientation val="minMax"/>
+        </c:scaling>
+        <c:delete val="0"/>
+        <c:axPos val="b"/>
+        <c:title>
+          <c:layout/>
+          <c:overlay val="0"/>
+        </c:title>
+        <c:numFmt formatCode="General" sourceLinked="1"/>
+        <c:majorTickMark val="none"/>
+        <c:minorTickMark val="none"/>
+        <c:tickLblPos val="nextTo"/>
+        <c:crossAx val="48764032"/>
+        <c:crosses val="autoZero"/>
+        <c:crossBetween val="midCat"/>
+      </c:valAx>
+      <c:valAx>
+        <c:axId val="48764032"/>
+        <c:scaling>
+          <c:orientation val="minMax"/>
+        </c:scaling>
+        <c:delete val="0"/>
+        <c:axPos val="l"/>
+        <c:majorGridlines/>
+        <c:title>
+          <c:layout/>
+          <c:overlay val="0"/>
+        </c:title>
+        <c:numFmt formatCode="General" sourceLinked="1"/>
+        <c:majorTickMark val="none"/>
+        <c:minorTickMark val="none"/>
+        <c:tickLblPos val="nextTo"/>
+        <c:crossAx val="43457536"/>
+        <c:crosses val="autoZero"/>
+        <c:crossBetween val="midCat"/>
+      </c:valAx>
+    </c:plotArea>
+    <c:plotVisOnly val="1"/>
+    <c:dispBlanksAs val="gap"/>
+    <c:showDLblsOverMax val="0"/>
+  </c:chart>
+  <c:externalData r:id="rId1">
+    <c:autoUpdate val="0"/>
+  </c:externalData>
+</c:chartSpace>
+</file>
+
 <file path=ppt/slideLayouts/slideLayout1.xml><?xml version="1.0" encoding="utf-8"?>
 <p:sldLayout xmlns:a="http://schemas.openxmlformats.org/drawingml/2006/main" xmlns:r="http://schemas.openxmlformats.org/officeDocument/2006/relationships" xmlns:p="http://schemas.openxmlformats.org/presentationml/2006/main" showMasterSp="0" type="title" preserve="1">
   <p:cSld name="Title Slide">
@@ -500,7 +1789,7 @@
           <a:p>
             <a:fld id="{80833930-F276-4C00-9052-91E17C5FF478}" type="datetimeFigureOut">
               <a:rPr lang="en-US" smtClean="0"/>
-              <a:t>12/11/2010</a:t>
+              <a:t>12/13/2010</a:t>
             </a:fld>
             <a:endParaRPr lang="en-US"/>
           </a:p>
@@ -665,7 +1954,7 @@
           <a:p>
             <a:fld id="{80833930-F276-4C00-9052-91E17C5FF478}" type="datetimeFigureOut">
               <a:rPr lang="en-US" smtClean="0"/>
-              <a:t>12/11/2010</a:t>
+              <a:t>12/13/2010</a:t>
             </a:fld>
             <a:endParaRPr lang="en-US"/>
           </a:p>
@@ -840,7 +2129,7 @@
           <a:p>
             <a:fld id="{80833930-F276-4C00-9052-91E17C5FF478}" type="datetimeFigureOut">
               <a:rPr lang="en-US" smtClean="0"/>
-              <a:t>12/11/2010</a:t>
+              <a:t>12/13/2010</a:t>
             </a:fld>
             <a:endParaRPr lang="en-US"/>
           </a:p>
@@ -1009,7 +2298,7 @@
           <a:p>
             <a:fld id="{80833930-F276-4C00-9052-91E17C5FF478}" type="datetimeFigureOut">
               <a:rPr lang="en-US" smtClean="0"/>
-              <a:t>12/11/2010</a:t>
+              <a:t>12/13/2010</a:t>
             </a:fld>
             <a:endParaRPr lang="en-US"/>
           </a:p>
@@ -1464,7 +2753,7 @@
           <a:p>
             <a:fld id="{80833930-F276-4C00-9052-91E17C5FF478}" type="datetimeFigureOut">
               <a:rPr lang="en-US" smtClean="0"/>
-              <a:t>12/11/2010</a:t>
+              <a:t>12/13/2010</a:t>
             </a:fld>
             <a:endParaRPr lang="en-US"/>
           </a:p>
@@ -1728,7 +3017,7 @@
           <a:p>
             <a:fld id="{80833930-F276-4C00-9052-91E17C5FF478}" type="datetimeFigureOut">
               <a:rPr lang="en-US" smtClean="0"/>
-              <a:t>12/11/2010</a:t>
+              <a:t>12/13/2010</a:t>
             </a:fld>
             <a:endParaRPr lang="en-US"/>
           </a:p>
@@ -2102,7 +3391,7 @@
           <a:p>
             <a:fld id="{80833930-F276-4C00-9052-91E17C5FF478}" type="datetimeFigureOut">
               <a:rPr lang="en-US" smtClean="0"/>
-              <a:t>12/11/2010</a:t>
+              <a:t>12/13/2010</a:t>
             </a:fld>
             <a:endParaRPr lang="en-US"/>
           </a:p>
@@ -2224,7 +3513,7 @@
           <a:p>
             <a:fld id="{80833930-F276-4C00-9052-91E17C5FF478}" type="datetimeFigureOut">
               <a:rPr lang="en-US" smtClean="0"/>
-              <a:t>12/11/2010</a:t>
+              <a:t>12/13/2010</a:t>
             </a:fld>
             <a:endParaRPr lang="en-US"/>
           </a:p>
@@ -2314,7 +3603,7 @@
           <a:p>
             <a:fld id="{80833930-F276-4C00-9052-91E17C5FF478}" type="datetimeFigureOut">
               <a:rPr lang="en-US" smtClean="0"/>
-              <a:t>12/11/2010</a:t>
+              <a:t>12/13/2010</a:t>
             </a:fld>
             <a:endParaRPr lang="en-US"/>
           </a:p>
@@ -2563,7 +3852,7 @@
           <a:p>
             <a:fld id="{80833930-F276-4C00-9052-91E17C5FF478}" type="datetimeFigureOut">
               <a:rPr lang="en-US" smtClean="0"/>
-              <a:t>12/11/2010</a:t>
+              <a:t>12/13/2010</a:t>
             </a:fld>
             <a:endParaRPr lang="en-US"/>
           </a:p>
@@ -2822,7 +4111,7 @@
           <a:p>
             <a:fld id="{80833930-F276-4C00-9052-91E17C5FF478}" type="datetimeFigureOut">
               <a:rPr lang="en-US" smtClean="0"/>
-              <a:t>12/11/2010</a:t>
+              <a:t>12/13/2010</a:t>
             </a:fld>
             <a:endParaRPr lang="en-US"/>
           </a:p>
@@ -3226,7 +4515,7 @@
           <a:p>
             <a:fld id="{80833930-F276-4C00-9052-91E17C5FF478}" type="datetimeFigureOut">
               <a:rPr lang="en-US" smtClean="0"/>
-              <a:t>12/11/2010</a:t>
+              <a:t>12/13/2010</a:t>
             </a:fld>
             <a:endParaRPr lang="en-US"/>
           </a:p>
@@ -3744,11 +5033,429 @@
         </p:nvSpPr>
         <p:spPr/>
         <p:txBody>
+          <a:bodyPr>
+            <a:normAutofit fontScale="90000"/>
+          </a:bodyPr>
+          <a:lstStyle/>
+          <a:p>
+            <a:r>
+              <a:rPr lang="en-US" dirty="0" smtClean="0"/>
+              <a:t>Results – Innocence vs. P</a:t>
+            </a:r>
+            <a:r>
+              <a:rPr lang="en-US" baseline="-25000" dirty="0" smtClean="0"/>
+              <a:t>f</a:t>
+            </a:r>
+            <a:r>
+              <a:rPr lang="en-US" dirty="0" smtClean="0"/>
+              <a:t> AND Crowd Size</a:t>
+            </a:r>
+            <a:endParaRPr lang="en-US" dirty="0"/>
+          </a:p>
+        </p:txBody>
+      </p:sp>
+      <p:graphicFrame>
+        <p:nvGraphicFramePr>
+          <p:cNvPr id="4" name="Content Placeholder 3"/>
+          <p:cNvGraphicFramePr>
+            <a:graphicFrameLocks noGrp="1"/>
+          </p:cNvGraphicFramePr>
+          <p:nvPr>
+            <p:ph idx="1"/>
+          </p:nvPr>
+        </p:nvGraphicFramePr>
+        <p:xfrm>
+          <a:off x="457200" y="1600200"/>
+          <a:ext cx="7467600" cy="4525963"/>
+        </p:xfrm>
+        <a:graphic>
+          <a:graphicData uri="http://schemas.openxmlformats.org/drawingml/2006/chart">
+            <c:chart xmlns:c="http://schemas.openxmlformats.org/drawingml/2006/chart" xmlns:r="http://schemas.openxmlformats.org/officeDocument/2006/relationships" r:id="rId2"/>
+          </a:graphicData>
+        </a:graphic>
+      </p:graphicFrame>
+    </p:spTree>
+    <p:extLst>
+      <p:ext uri="{BB962C8B-B14F-4D97-AF65-F5344CB8AC3E}">
+        <p14:creationId xmlns:p14="http://schemas.microsoft.com/office/powerpoint/2010/main" val="2541662113"/>
+      </p:ext>
+    </p:extLst>
+  </p:cSld>
+  <p:clrMapOvr>
+    <a:masterClrMapping/>
+  </p:clrMapOvr>
+  <p:timing>
+    <p:tnLst>
+      <p:par>
+        <p:cTn id="1" dur="indefinite" restart="never" nodeType="tmRoot"/>
+      </p:par>
+    </p:tnLst>
+  </p:timing>
+</p:sld>
+</file>
+
+<file path=ppt/slides/slide11.xml><?xml version="1.0" encoding="utf-8"?>
+<p:sld xmlns:a="http://schemas.openxmlformats.org/drawingml/2006/main" xmlns:r="http://schemas.openxmlformats.org/officeDocument/2006/relationships" xmlns:p="http://schemas.openxmlformats.org/presentationml/2006/main">
+  <p:cSld>
+    <p:spTree>
+      <p:nvGrpSpPr>
+        <p:cNvPr id="1" name=""/>
+        <p:cNvGrpSpPr/>
+        <p:nvPr/>
+      </p:nvGrpSpPr>
+      <p:grpSpPr>
+        <a:xfrm>
+          <a:off x="0" y="0"/>
+          <a:ext cx="0" cy="0"/>
+          <a:chOff x="0" y="0"/>
+          <a:chExt cx="0" cy="0"/>
+        </a:xfrm>
+      </p:grpSpPr>
+      <p:sp>
+        <p:nvSpPr>
+          <p:cNvPr id="2" name="Title 1"/>
+          <p:cNvSpPr>
+            <a:spLocks noGrp="1"/>
+          </p:cNvSpPr>
+          <p:nvPr>
+            <p:ph type="title"/>
+          </p:nvPr>
+        </p:nvSpPr>
+        <p:spPr/>
+        <p:txBody>
+          <a:bodyPr>
+            <a:normAutofit fontScale="90000"/>
+          </a:bodyPr>
+          <a:lstStyle/>
+          <a:p>
+            <a:r>
+              <a:rPr lang="en-US" dirty="0" smtClean="0"/>
+              <a:t>Results – Performance vs. Innocence </a:t>
+            </a:r>
+            <a:endParaRPr lang="en-US" dirty="0"/>
+          </a:p>
+        </p:txBody>
+      </p:sp>
+      <p:graphicFrame>
+        <p:nvGraphicFramePr>
+          <p:cNvPr id="4" name="Content Placeholder 3"/>
+          <p:cNvGraphicFramePr>
+            <a:graphicFrameLocks noGrp="1"/>
+          </p:cNvGraphicFramePr>
+          <p:nvPr>
+            <p:ph idx="1"/>
+          </p:nvPr>
+        </p:nvGraphicFramePr>
+        <p:xfrm>
+          <a:off x="457200" y="1600200"/>
+          <a:ext cx="7467600" cy="4525963"/>
+        </p:xfrm>
+        <a:graphic>
+          <a:graphicData uri="http://schemas.openxmlformats.org/drawingml/2006/chart">
+            <c:chart xmlns:c="http://schemas.openxmlformats.org/drawingml/2006/chart" xmlns:r="http://schemas.openxmlformats.org/officeDocument/2006/relationships" r:id="rId2"/>
+          </a:graphicData>
+        </a:graphic>
+      </p:graphicFrame>
+    </p:spTree>
+    <p:extLst>
+      <p:ext uri="{BB962C8B-B14F-4D97-AF65-F5344CB8AC3E}">
+        <p14:creationId xmlns:p14="http://schemas.microsoft.com/office/powerpoint/2010/main" val="3512092543"/>
+      </p:ext>
+    </p:extLst>
+  </p:cSld>
+  <p:clrMapOvr>
+    <a:masterClrMapping/>
+  </p:clrMapOvr>
+  <p:timing>
+    <p:tnLst>
+      <p:par>
+        <p:cTn id="1" dur="indefinite" restart="never" nodeType="tmRoot"/>
+      </p:par>
+    </p:tnLst>
+  </p:timing>
+</p:sld>
+</file>
+
+<file path=ppt/slides/slide12.xml><?xml version="1.0" encoding="utf-8"?>
+<p:sld xmlns:a="http://schemas.openxmlformats.org/drawingml/2006/main" xmlns:r="http://schemas.openxmlformats.org/officeDocument/2006/relationships" xmlns:p="http://schemas.openxmlformats.org/presentationml/2006/main">
+  <p:cSld>
+    <p:spTree>
+      <p:nvGrpSpPr>
+        <p:cNvPr id="1" name=""/>
+        <p:cNvGrpSpPr/>
+        <p:nvPr/>
+      </p:nvGrpSpPr>
+      <p:grpSpPr>
+        <a:xfrm>
+          <a:off x="0" y="0"/>
+          <a:ext cx="0" cy="0"/>
+          <a:chOff x="0" y="0"/>
+          <a:chExt cx="0" cy="0"/>
+        </a:xfrm>
+      </p:grpSpPr>
+      <p:sp>
+        <p:nvSpPr>
+          <p:cNvPr id="2" name="Title 1"/>
+          <p:cNvSpPr>
+            <a:spLocks noGrp="1"/>
+          </p:cNvSpPr>
+          <p:nvPr>
+            <p:ph type="title"/>
+          </p:nvPr>
+        </p:nvSpPr>
+        <p:spPr/>
+        <p:txBody>
+          <a:bodyPr>
+            <a:normAutofit fontScale="90000"/>
+          </a:bodyPr>
+          <a:lstStyle/>
+          <a:p>
+            <a:r>
+              <a:rPr lang="en-US" dirty="0" smtClean="0"/>
+              <a:t>Results – Performance vs. Innocence</a:t>
+            </a:r>
+            <a:endParaRPr lang="en-US" dirty="0"/>
+          </a:p>
+        </p:txBody>
+      </p:sp>
+      <p:graphicFrame>
+        <p:nvGraphicFramePr>
+          <p:cNvPr id="5" name="Content Placeholder 4"/>
+          <p:cNvGraphicFramePr>
+            <a:graphicFrameLocks noGrp="1"/>
+          </p:cNvGraphicFramePr>
+          <p:nvPr>
+            <p:ph idx="1"/>
+            <p:extLst>
+              <p:ext uri="{D42A27DB-BD31-4B8C-83A1-F6EECF244321}">
+                <p14:modId xmlns:p14="http://schemas.microsoft.com/office/powerpoint/2010/main" val="1356272954"/>
+              </p:ext>
+            </p:extLst>
+          </p:nvPr>
+        </p:nvGraphicFramePr>
+        <p:xfrm>
+          <a:off x="457200" y="1524000"/>
+          <a:ext cx="7467600" cy="4525963"/>
+        </p:xfrm>
+        <a:graphic>
+          <a:graphicData uri="http://schemas.openxmlformats.org/drawingml/2006/chart">
+            <c:chart xmlns:c="http://schemas.openxmlformats.org/drawingml/2006/chart" xmlns:r="http://schemas.openxmlformats.org/officeDocument/2006/relationships" r:id="rId2"/>
+          </a:graphicData>
+        </a:graphic>
+      </p:graphicFrame>
+    </p:spTree>
+    <p:extLst>
+      <p:ext uri="{BB962C8B-B14F-4D97-AF65-F5344CB8AC3E}">
+        <p14:creationId xmlns:p14="http://schemas.microsoft.com/office/powerpoint/2010/main" val="1440287035"/>
+      </p:ext>
+    </p:extLst>
+  </p:cSld>
+  <p:clrMapOvr>
+    <a:masterClrMapping/>
+  </p:clrMapOvr>
+  <p:timing>
+    <p:tnLst>
+      <p:par>
+        <p:cTn id="1" dur="indefinite" restart="never" nodeType="tmRoot"/>
+      </p:par>
+    </p:tnLst>
+  </p:timing>
+</p:sld>
+</file>
+
+<file path=ppt/slides/slide13.xml><?xml version="1.0" encoding="utf-8"?>
+<p:sld xmlns:a="http://schemas.openxmlformats.org/drawingml/2006/main" xmlns:r="http://schemas.openxmlformats.org/officeDocument/2006/relationships" xmlns:p="http://schemas.openxmlformats.org/presentationml/2006/main">
+  <p:cSld>
+    <p:spTree>
+      <p:nvGrpSpPr>
+        <p:cNvPr id="1" name=""/>
+        <p:cNvGrpSpPr/>
+        <p:nvPr/>
+      </p:nvGrpSpPr>
+      <p:grpSpPr>
+        <a:xfrm>
+          <a:off x="0" y="0"/>
+          <a:ext cx="0" cy="0"/>
+          <a:chOff x="0" y="0"/>
+          <a:chExt cx="0" cy="0"/>
+        </a:xfrm>
+      </p:grpSpPr>
+      <p:sp>
+        <p:nvSpPr>
+          <p:cNvPr id="2" name="Title 1"/>
+          <p:cNvSpPr>
+            <a:spLocks noGrp="1"/>
+          </p:cNvSpPr>
+          <p:nvPr>
+            <p:ph type="title"/>
+          </p:nvPr>
+        </p:nvSpPr>
+        <p:spPr/>
+        <p:txBody>
           <a:bodyPr/>
           <a:lstStyle/>
           <a:p>
             <a:r>
               <a:rPr lang="en-US" dirty="0" smtClean="0"/>
+              <a:t>Path Length vs. Innocence</a:t>
+            </a:r>
+            <a:endParaRPr lang="en-US" dirty="0"/>
+          </a:p>
+        </p:txBody>
+      </p:sp>
+      <p:graphicFrame>
+        <p:nvGraphicFramePr>
+          <p:cNvPr id="4" name="Content Placeholder 3"/>
+          <p:cNvGraphicFramePr>
+            <a:graphicFrameLocks noGrp="1"/>
+          </p:cNvGraphicFramePr>
+          <p:nvPr>
+            <p:ph idx="1"/>
+          </p:nvPr>
+        </p:nvGraphicFramePr>
+        <p:xfrm>
+          <a:off x="457200" y="1600200"/>
+          <a:ext cx="7467600" cy="4525963"/>
+        </p:xfrm>
+        <a:graphic>
+          <a:graphicData uri="http://schemas.openxmlformats.org/drawingml/2006/chart">
+            <c:chart xmlns:c="http://schemas.openxmlformats.org/drawingml/2006/chart" xmlns:r="http://schemas.openxmlformats.org/officeDocument/2006/relationships" r:id="rId2"/>
+          </a:graphicData>
+        </a:graphic>
+      </p:graphicFrame>
+    </p:spTree>
+    <p:extLst>
+      <p:ext uri="{BB962C8B-B14F-4D97-AF65-F5344CB8AC3E}">
+        <p14:creationId xmlns:p14="http://schemas.microsoft.com/office/powerpoint/2010/main" val="4216039892"/>
+      </p:ext>
+    </p:extLst>
+  </p:cSld>
+  <p:clrMapOvr>
+    <a:masterClrMapping/>
+  </p:clrMapOvr>
+  <p:timing>
+    <p:tnLst>
+      <p:par>
+        <p:cTn id="1" dur="indefinite" restart="never" nodeType="tmRoot"/>
+      </p:par>
+    </p:tnLst>
+  </p:timing>
+</p:sld>
+</file>
+
+<file path=ppt/slides/slide14.xml><?xml version="1.0" encoding="utf-8"?>
+<p:sld xmlns:a="http://schemas.openxmlformats.org/drawingml/2006/main" xmlns:r="http://schemas.openxmlformats.org/officeDocument/2006/relationships" xmlns:p="http://schemas.openxmlformats.org/presentationml/2006/main">
+  <p:cSld>
+    <p:spTree>
+      <p:nvGrpSpPr>
+        <p:cNvPr id="1" name=""/>
+        <p:cNvGrpSpPr/>
+        <p:nvPr/>
+      </p:nvGrpSpPr>
+      <p:grpSpPr>
+        <a:xfrm>
+          <a:off x="0" y="0"/>
+          <a:ext cx="0" cy="0"/>
+          <a:chOff x="0" y="0"/>
+          <a:chExt cx="0" cy="0"/>
+        </a:xfrm>
+      </p:grpSpPr>
+      <p:sp>
+        <p:nvSpPr>
+          <p:cNvPr id="2" name="Title 1"/>
+          <p:cNvSpPr>
+            <a:spLocks noGrp="1"/>
+          </p:cNvSpPr>
+          <p:nvPr>
+            <p:ph type="title"/>
+          </p:nvPr>
+        </p:nvSpPr>
+        <p:spPr/>
+        <p:txBody>
+          <a:bodyPr/>
+          <a:lstStyle/>
+          <a:p>
+            <a:r>
+              <a:rPr lang="en-US" dirty="0"/>
+              <a:t>Path Length vs. Innocence</a:t>
+            </a:r>
+          </a:p>
+        </p:txBody>
+      </p:sp>
+      <p:graphicFrame>
+        <p:nvGraphicFramePr>
+          <p:cNvPr id="4" name="Content Placeholder 3"/>
+          <p:cNvGraphicFramePr>
+            <a:graphicFrameLocks noGrp="1"/>
+          </p:cNvGraphicFramePr>
+          <p:nvPr>
+            <p:ph idx="1"/>
+          </p:nvPr>
+        </p:nvGraphicFramePr>
+        <p:xfrm>
+          <a:off x="457200" y="1600200"/>
+          <a:ext cx="7467600" cy="4525963"/>
+        </p:xfrm>
+        <a:graphic>
+          <a:graphicData uri="http://schemas.openxmlformats.org/drawingml/2006/chart">
+            <c:chart xmlns:c="http://schemas.openxmlformats.org/drawingml/2006/chart" xmlns:r="http://schemas.openxmlformats.org/officeDocument/2006/relationships" r:id="rId2"/>
+          </a:graphicData>
+        </a:graphic>
+      </p:graphicFrame>
+    </p:spTree>
+    <p:extLst>
+      <p:ext uri="{BB962C8B-B14F-4D97-AF65-F5344CB8AC3E}">
+        <p14:creationId xmlns:p14="http://schemas.microsoft.com/office/powerpoint/2010/main" val="4112825600"/>
+      </p:ext>
+    </p:extLst>
+  </p:cSld>
+  <p:clrMapOvr>
+    <a:masterClrMapping/>
+  </p:clrMapOvr>
+  <p:timing>
+    <p:tnLst>
+      <p:par>
+        <p:cTn id="1" dur="indefinite" restart="never" nodeType="tmRoot"/>
+      </p:par>
+    </p:tnLst>
+  </p:timing>
+</p:sld>
+</file>
+
+<file path=ppt/slides/slide15.xml><?xml version="1.0" encoding="utf-8"?>
+<p:sld xmlns:a="http://schemas.openxmlformats.org/drawingml/2006/main" xmlns:r="http://schemas.openxmlformats.org/officeDocument/2006/relationships" xmlns:p="http://schemas.openxmlformats.org/presentationml/2006/main">
+  <p:cSld>
+    <p:spTree>
+      <p:nvGrpSpPr>
+        <p:cNvPr id="1" name=""/>
+        <p:cNvGrpSpPr/>
+        <p:nvPr/>
+      </p:nvGrpSpPr>
+      <p:grpSpPr>
+        <a:xfrm>
+          <a:off x="0" y="0"/>
+          <a:ext cx="0" cy="0"/>
+          <a:chOff x="0" y="0"/>
+          <a:chExt cx="0" cy="0"/>
+        </a:xfrm>
+      </p:grpSpPr>
+      <p:sp>
+        <p:nvSpPr>
+          <p:cNvPr id="2" name="Title 1"/>
+          <p:cNvSpPr>
+            <a:spLocks noGrp="1"/>
+          </p:cNvSpPr>
+          <p:nvPr>
+            <p:ph type="title"/>
+          </p:nvPr>
+        </p:nvSpPr>
+        <p:spPr/>
+        <p:txBody>
+          <a:bodyPr/>
+          <a:lstStyle/>
+          <a:p>
+            <a:r>
+              <a:rPr lang="en-US" dirty="0" smtClean="0"/>
               <a:t>Conclusion</a:t>
             </a:r>
             <a:endParaRPr lang="en-US" dirty="0"/>
@@ -3770,7 +5477,61 @@
           <a:bodyPr/>
           <a:lstStyle/>
           <a:p>
-            <a:endParaRPr lang="en-US"/>
+            <a:r>
+              <a:rPr lang="en-US" dirty="0" smtClean="0"/>
+              <a:t>Performance is exponentially related to P</a:t>
+            </a:r>
+            <a:r>
+              <a:rPr lang="en-US" baseline="-25000" dirty="0" smtClean="0"/>
+              <a:t>f</a:t>
+            </a:r>
+          </a:p>
+          <a:p>
+            <a:r>
+              <a:rPr lang="en-US" dirty="0" smtClean="0"/>
+              <a:t>BUT, </a:t>
+            </a:r>
+            <a:r>
+              <a:rPr lang="en-US" dirty="0" smtClean="0"/>
+              <a:t>privacy only </a:t>
+            </a:r>
+            <a:r>
+              <a:rPr lang="en-US" dirty="0"/>
+              <a:t>grows </a:t>
+            </a:r>
+            <a:r>
+              <a:rPr lang="en-US" dirty="0" smtClean="0"/>
+              <a:t>by the log of P</a:t>
+            </a:r>
+            <a:r>
+              <a:rPr lang="en-US" baseline="-25000" dirty="0" smtClean="0"/>
+              <a:t>f</a:t>
+            </a:r>
+            <a:r>
+              <a:rPr lang="en-US" dirty="0" smtClean="0"/>
+              <a:t> </a:t>
+            </a:r>
+          </a:p>
+          <a:p>
+            <a:r>
+              <a:rPr lang="en-US" dirty="0"/>
+              <a:t>Optimal </a:t>
+            </a:r>
+            <a:r>
+              <a:rPr lang="en-US" dirty="0" smtClean="0"/>
+              <a:t>P</a:t>
+            </a:r>
+            <a:r>
+              <a:rPr lang="en-US" baseline="-25000" dirty="0" smtClean="0"/>
+              <a:t>f</a:t>
+            </a:r>
+            <a:r>
+              <a:rPr lang="en-US" dirty="0" smtClean="0"/>
+              <a:t> for a given crowd configuration</a:t>
+            </a:r>
+          </a:p>
+          <a:p>
+            <a:endParaRPr lang="en-US" dirty="0"/>
           </a:p>
         </p:txBody>
       </p:sp>
@@ -3823,57 +5584,58 @@
         </p:nvSpPr>
         <p:spPr/>
         <p:txBody>
+          <a:bodyPr>
+            <a:normAutofit/>
+          </a:bodyPr>
+          <a:lstStyle/>
+          <a:p>
+            <a:r>
+              <a:rPr lang="en-US" dirty="0" smtClean="0"/>
+              <a:t>Motivation</a:t>
+            </a:r>
+            <a:endParaRPr lang="en-US" dirty="0"/>
+          </a:p>
+        </p:txBody>
+      </p:sp>
+      <p:sp>
+        <p:nvSpPr>
+          <p:cNvPr id="3" name="Content Placeholder 2"/>
+          <p:cNvSpPr>
+            <a:spLocks noGrp="1"/>
+          </p:cNvSpPr>
+          <p:nvPr>
+            <p:ph idx="1"/>
+          </p:nvPr>
+        </p:nvSpPr>
+        <p:spPr/>
+        <p:txBody>
           <a:bodyPr/>
           <a:lstStyle/>
           <a:p>
             <a:r>
               <a:rPr lang="en-US" dirty="0" smtClean="0"/>
-              <a:t>What are Crowds?</a:t>
+              <a:t>Encryption can hide the content of a message, but not the actual transaction.</a:t>
+            </a:r>
+          </a:p>
+          <a:p>
+            <a:r>
+              <a:rPr lang="en-US" dirty="0" smtClean="0"/>
+              <a:t>Eavesdroppers and servers can record a clients IP, length of data, and time/frequency of communication.</a:t>
+            </a:r>
+          </a:p>
+          <a:p>
+            <a:r>
+              <a:rPr lang="en-US" dirty="0" smtClean="0"/>
+              <a:t>How can we hide these?</a:t>
             </a:r>
             <a:endParaRPr lang="en-US" dirty="0"/>
-          </a:p>
-        </p:txBody>
-      </p:sp>
-      <p:sp>
-        <p:nvSpPr>
-          <p:cNvPr id="3" name="Content Placeholder 2"/>
-          <p:cNvSpPr>
-            <a:spLocks noGrp="1"/>
-          </p:cNvSpPr>
-          <p:nvPr>
-            <p:ph idx="1"/>
-          </p:nvPr>
-        </p:nvSpPr>
-        <p:spPr/>
-        <p:txBody>
-          <a:bodyPr/>
-          <a:lstStyle/>
-          <a:p>
-            <a:r>
-              <a:rPr lang="en-US" dirty="0" smtClean="0"/>
-              <a:t>Collection of collaborating clients called “</a:t>
-            </a:r>
-            <a:r>
-              <a:rPr lang="en-US" dirty="0" err="1" smtClean="0"/>
-              <a:t>jondos</a:t>
-            </a:r>
-            <a:r>
-              <a:rPr lang="en-US" dirty="0" smtClean="0"/>
-              <a:t>”</a:t>
-            </a:r>
-          </a:p>
-          <a:p>
-            <a:r>
-              <a:rPr lang="en-US" dirty="0" smtClean="0"/>
-              <a:t>Anonymously issue web requests</a:t>
-            </a:r>
           </a:p>
         </p:txBody>
       </p:sp>
     </p:spTree>
     <p:extLst>
       <p:ext uri="{BB962C8B-B14F-4D97-AF65-F5344CB8AC3E}">
-        <p14:creationId xmlns:p14="http://schemas.microsoft.com/office/powerpoint/2010/main" val="159744083"/>
+        <p14:creationId xmlns:p14="http://schemas.microsoft.com/office/powerpoint/2010/main" val="770925298"/>
       </p:ext>
     </p:extLst>
   </p:cSld>
@@ -3924,7 +5686,7 @@
           <a:p>
             <a:r>
               <a:rPr lang="en-US" dirty="0" smtClean="0"/>
-              <a:t>How crowds work</a:t>
+              <a:t>Crowds</a:t>
             </a:r>
             <a:endParaRPr lang="en-US" dirty="0"/>
           </a:p>
@@ -3947,46 +5709,52 @@
           <a:p>
             <a:r>
               <a:rPr lang="en-US" dirty="0" smtClean="0"/>
-              <a:t>Any </a:t>
+              <a:t>Originally published by Rubin and Reiter, 1998.</a:t>
+            </a:r>
+          </a:p>
+          <a:p>
+            <a:r>
+              <a:rPr lang="en-US" dirty="0" smtClean="0"/>
+              <a:t>Collection </a:t>
+            </a:r>
+            <a:r>
+              <a:rPr lang="en-US" dirty="0" smtClean="0"/>
+              <a:t>of </a:t>
+            </a:r>
+            <a:r>
+              <a:rPr lang="en-US" dirty="0" smtClean="0"/>
+              <a:t>clients </a:t>
+            </a:r>
+            <a:r>
+              <a:rPr lang="en-US" dirty="0" smtClean="0"/>
+              <a:t>called “</a:t>
             </a:r>
             <a:r>
               <a:rPr lang="en-US" dirty="0" err="1" smtClean="0"/>
-              <a:t>jondo</a:t>
-            </a:r>
-            <a:r>
-              <a:rPr lang="en-US" dirty="0" smtClean="0"/>
-              <a:t> can initiate a web request</a:t>
-            </a:r>
-          </a:p>
-          <a:p>
-            <a:r>
-              <a:rPr lang="en-US" dirty="0" smtClean="0"/>
-              <a:t>Web requests are forwarded to either another </a:t>
-            </a:r>
-            <a:r>
-              <a:rPr lang="en-US" dirty="0" err="1" smtClean="0"/>
-              <a:t>jondo</a:t>
-            </a:r>
-            <a:r>
-              <a:rPr lang="en-US" dirty="0" smtClean="0"/>
-              <a:t> participating in the crowd or the end server</a:t>
-            </a:r>
-          </a:p>
-          <a:p>
-            <a:r>
-              <a:rPr lang="en-US" dirty="0" smtClean="0"/>
-              <a:t>The server knows who finally forwarded the request, but no idea who initiated it</a:t>
-            </a:r>
-          </a:p>
-          <a:p>
-            <a:endParaRPr lang="en-US" dirty="0"/>
+              <a:t>jondos</a:t>
+            </a:r>
+            <a:r>
+              <a:rPr lang="en-US" dirty="0" smtClean="0"/>
+              <a:t>” (As in John Doe)</a:t>
+            </a:r>
+            <a:endParaRPr lang="en-US" dirty="0" smtClean="0"/>
+          </a:p>
+          <a:p>
+            <a:r>
+              <a:rPr lang="en-US" dirty="0" smtClean="0"/>
+              <a:t>Anonymously issue web </a:t>
+            </a:r>
+            <a:r>
+              <a:rPr lang="en-US" dirty="0" smtClean="0"/>
+              <a:t>requests</a:t>
+            </a:r>
           </a:p>
         </p:txBody>
       </p:sp>
     </p:spTree>
     <p:extLst>
       <p:ext uri="{BB962C8B-B14F-4D97-AF65-F5344CB8AC3E}">
-        <p14:creationId xmlns:p14="http://schemas.microsoft.com/office/powerpoint/2010/main" val="1506436138"/>
+        <p14:creationId xmlns:p14="http://schemas.microsoft.com/office/powerpoint/2010/main" val="159744083"/>
       </p:ext>
     </p:extLst>
   </p:cSld>
@@ -4060,30 +5828,46 @@
           <a:p>
             <a:r>
               <a:rPr lang="en-US" dirty="0" smtClean="0"/>
-              <a:t>Forwarding paths are randomized by P</a:t>
-            </a:r>
-            <a:r>
-              <a:rPr lang="en-US" baseline="-25000" dirty="0" smtClean="0"/>
-              <a:t>f</a:t>
-            </a:r>
-            <a:r>
-              <a:rPr lang="en-US" dirty="0" smtClean="0"/>
-              <a:t> (probability of forwarding), but pre-computed by a centralized “blender”</a:t>
-            </a:r>
-          </a:p>
-          <a:p>
-            <a:r>
-              <a:rPr lang="en-US" dirty="0" smtClean="0"/>
-              <a:t>The blender manages </a:t>
+              <a:t>Web </a:t>
+            </a:r>
+            <a:r>
+              <a:rPr lang="en-US" dirty="0" smtClean="0"/>
+              <a:t>requests are forwarded to either another </a:t>
             </a:r>
             <a:r>
               <a:rPr lang="en-US" dirty="0" err="1" smtClean="0"/>
-              <a:t>jondos</a:t>
-            </a:r>
-            <a:r>
-              <a:rPr lang="en-US" dirty="0" smtClean="0"/>
-              <a:t> joining and leaving the crowd in addition to path computation</a:t>
-            </a:r>
+              <a:t>jondo</a:t>
+            </a:r>
+            <a:r>
+              <a:rPr lang="en-US" dirty="0" smtClean="0"/>
+              <a:t> or </a:t>
+            </a:r>
+            <a:r>
+              <a:rPr lang="en-US" dirty="0" smtClean="0"/>
+              <a:t>the end server</a:t>
+            </a:r>
+          </a:p>
+          <a:p>
+            <a:r>
+              <a:rPr lang="en-US" dirty="0" smtClean="0"/>
+              <a:t>The server knows who finally forwarded the request, but no idea who initiated </a:t>
+            </a:r>
+            <a:r>
+              <a:rPr lang="en-US" dirty="0" smtClean="0"/>
+              <a:t>it</a:t>
+            </a:r>
+          </a:p>
+          <a:p>
+            <a:r>
+              <a:rPr lang="en-US" dirty="0" smtClean="0"/>
+              <a:t>//Insert image</a:t>
+            </a:r>
+            <a:endParaRPr lang="en-US" dirty="0" smtClean="0"/>
+          </a:p>
+          <a:p>
+            <a:endParaRPr lang="en-US" dirty="0" smtClean="0"/>
+          </a:p>
+          <a:p>
             <a:endParaRPr lang="en-US" dirty="0"/>
           </a:p>
         </p:txBody>
@@ -4091,7 +5875,7 @@
     </p:spTree>
     <p:extLst>
       <p:ext uri="{BB962C8B-B14F-4D97-AF65-F5344CB8AC3E}">
-        <p14:creationId xmlns:p14="http://schemas.microsoft.com/office/powerpoint/2010/main" val="3162734787"/>
+        <p14:creationId xmlns:p14="http://schemas.microsoft.com/office/powerpoint/2010/main" val="1506436138"/>
       </p:ext>
     </p:extLst>
   </p:cSld>
@@ -4142,7 +5926,7 @@
           <a:p>
             <a:r>
               <a:rPr lang="en-US" dirty="0" smtClean="0"/>
-              <a:t>Problem</a:t>
+              <a:t>How crowds work</a:t>
             </a:r>
             <a:endParaRPr lang="en-US" dirty="0"/>
           </a:p>
@@ -4165,48 +5949,42 @@
           <a:p>
             <a:r>
               <a:rPr lang="en-US" dirty="0" smtClean="0"/>
-              <a:t>What if a subset of the </a:t>
+              <a:t>A</a:t>
+            </a:r>
+            <a:r>
+              <a:rPr lang="en-US" dirty="0" smtClean="0"/>
+              <a:t> “centralized blender” </a:t>
             </a:r>
             <a:r>
               <a:rPr lang="en-US" dirty="0" err="1" smtClean="0"/>
-              <a:t>jondos</a:t>
-            </a:r>
-            <a:r>
-              <a:rPr lang="en-US" dirty="0" smtClean="0"/>
-              <a:t> are collaborating against the rest? Called “attackers”</a:t>
-            </a:r>
-          </a:p>
-          <a:p>
-            <a:r>
-              <a:rPr lang="en-US" dirty="0"/>
-              <a:t>M</a:t>
-            </a:r>
-            <a:r>
-              <a:rPr lang="en-US" dirty="0" smtClean="0"/>
-              <a:t>ultiple “attacking” </a:t>
-            </a:r>
-            <a:r>
-              <a:rPr lang="en-US" dirty="0" err="1" smtClean="0"/>
-              <a:t>jondos</a:t>
-            </a:r>
-            <a:r>
-              <a:rPr lang="en-US" dirty="0" smtClean="0"/>
-              <a:t> can determine where a request originated with a certain probability.</a:t>
-            </a:r>
-          </a:p>
-          <a:p>
-            <a:r>
-              <a:rPr lang="en-US" dirty="0" smtClean="0"/>
-              <a:t>If we know the crowd size, we can adjust the path forwarding to insure probable innocence</a:t>
-            </a:r>
-            <a:endParaRPr lang="en-US" dirty="0"/>
+              <a:t>manges</a:t>
+            </a:r>
+            <a:r>
+              <a:rPr lang="en-US" dirty="0" smtClean="0"/>
+              <a:t> metadata, e.g. crowd membership, random paths, keys, etc.</a:t>
+            </a:r>
+          </a:p>
+          <a:p>
+            <a:r>
+              <a:rPr lang="en-US" dirty="0" smtClean="0"/>
+              <a:t>Blender pre-computes random paths using a probability of forwarding, P</a:t>
+            </a:r>
+            <a:r>
+              <a:rPr lang="en-US" baseline="-25000" dirty="0" smtClean="0"/>
+              <a:t>f</a:t>
+            </a:r>
+            <a:r>
+              <a:rPr lang="en-US" dirty="0" smtClean="0"/>
+              <a:t>.</a:t>
+            </a:r>
+            <a:endParaRPr lang="en-US" dirty="0" smtClean="0"/>
           </a:p>
         </p:txBody>
       </p:sp>
     </p:spTree>
     <p:extLst>
       <p:ext uri="{BB962C8B-B14F-4D97-AF65-F5344CB8AC3E}">
-        <p14:creationId xmlns:p14="http://schemas.microsoft.com/office/powerpoint/2010/main" val="2721213558"/>
+        <p14:creationId xmlns:p14="http://schemas.microsoft.com/office/powerpoint/2010/main" val="3162734787"/>
       </p:ext>
     </p:extLst>
   </p:cSld>
@@ -4257,7 +6035,7 @@
           <a:p>
             <a:r>
               <a:rPr lang="en-US" dirty="0" smtClean="0"/>
-              <a:t>Probable Innocence</a:t>
+              <a:t>Problem</a:t>
             </a:r>
             <a:endParaRPr lang="en-US" dirty="0"/>
           </a:p>
@@ -4280,31 +6058,68 @@
           <a:p>
             <a:r>
               <a:rPr lang="en-US" dirty="0" smtClean="0"/>
-              <a:t>Given the crowd size, the number of attackers, and the probability of forwarding; Probable Innocence is defined as:</a:t>
-            </a:r>
-          </a:p>
-          <a:p>
-            <a:pPr lvl="1"/>
-            <a:r>
-              <a:rPr lang="en-US" dirty="0" smtClean="0"/>
-              <a:t>Y=</a:t>
-            </a:r>
-            <a:r>
-              <a:rPr lang="en-US" dirty="0" err="1" smtClean="0"/>
-              <a:t>mx+b</a:t>
+              <a:t>A crowd may contain collaborators, called </a:t>
+            </a:r>
+            <a:r>
+              <a:rPr lang="en-US" dirty="0" smtClean="0"/>
+              <a:t>“attackers</a:t>
+            </a:r>
+            <a:r>
+              <a:rPr lang="en-US" dirty="0" smtClean="0"/>
+              <a:t>”</a:t>
+            </a:r>
+          </a:p>
+          <a:p>
+            <a:r>
+              <a:rPr lang="en-US" dirty="0" smtClean="0"/>
+              <a:t>“attackers” </a:t>
+            </a:r>
+            <a:r>
+              <a:rPr lang="en-US" dirty="0" smtClean="0"/>
+              <a:t>can determine where a request originated with a certain probability.</a:t>
+            </a:r>
+          </a:p>
+          <a:p>
+            <a:r>
+              <a:rPr lang="en-US" dirty="0" smtClean="0"/>
+              <a:t>Sufficient crowd size</a:t>
+            </a:r>
+            <a:r>
+              <a:rPr lang="en-US" dirty="0"/>
+              <a:t> </a:t>
+            </a:r>
+            <a:r>
+              <a:rPr lang="en-US" dirty="0" smtClean="0"/>
+              <a:t>and</a:t>
+            </a:r>
+            <a:r>
+              <a:rPr lang="en-US" dirty="0" smtClean="0"/>
+              <a:t> </a:t>
+            </a:r>
+            <a:r>
+              <a:rPr lang="en-US" dirty="0" smtClean="0"/>
+              <a:t>path forwarding </a:t>
+            </a:r>
+            <a:r>
+              <a:rPr lang="en-US" dirty="0" smtClean="0"/>
+              <a:t>can</a:t>
+            </a:r>
+            <a:r>
+              <a:rPr lang="en-US" dirty="0" smtClean="0"/>
+              <a:t> </a:t>
+            </a:r>
+            <a:r>
+              <a:rPr lang="en-US" dirty="0" smtClean="0"/>
+              <a:t>insure probable innocence</a:t>
             </a:r>
             <a:endParaRPr lang="en-US" dirty="0"/>
-          </a:p>
-          <a:p>
-            <a:pPr lvl="1"/>
-            <a:endParaRPr lang="en-US" dirty="0" smtClean="0"/>
           </a:p>
         </p:txBody>
       </p:sp>
     </p:spTree>
     <p:extLst>
       <p:ext uri="{BB962C8B-B14F-4D97-AF65-F5344CB8AC3E}">
-        <p14:creationId xmlns:p14="http://schemas.microsoft.com/office/powerpoint/2010/main" val="89828850"/>
+        <p14:creationId xmlns:p14="http://schemas.microsoft.com/office/powerpoint/2010/main" val="2721213558"/>
       </p:ext>
     </p:extLst>
   </p:cSld>
@@ -4355,72 +6170,197 @@
           <a:p>
             <a:r>
               <a:rPr lang="en-US" dirty="0" smtClean="0"/>
-              <a:t>Our Simulation</a:t>
+              <a:t>Probable Innocence</a:t>
             </a:r>
             <a:endParaRPr lang="en-US" dirty="0"/>
           </a:p>
         </p:txBody>
       </p:sp>
-      <p:sp>
-        <p:nvSpPr>
-          <p:cNvPr id="3" name="Content Placeholder 2"/>
-          <p:cNvSpPr>
-            <a:spLocks noGrp="1"/>
-          </p:cNvSpPr>
-          <p:nvPr>
-            <p:ph idx="1"/>
-          </p:nvPr>
-        </p:nvSpPr>
-        <p:spPr/>
-        <p:txBody>
-          <a:bodyPr>
-            <a:normAutofit/>
-          </a:bodyPr>
-          <a:lstStyle/>
-          <a:p>
-            <a:r>
-              <a:rPr lang="en-US" dirty="0" smtClean="0"/>
-              <a:t>Designed to compare security and performance</a:t>
-            </a:r>
-          </a:p>
-          <a:p>
-            <a:r>
-              <a:rPr lang="en-US" dirty="0" smtClean="0"/>
-              <a:t>For a given number of </a:t>
-            </a:r>
-            <a:r>
-              <a:rPr lang="en-US" dirty="0" err="1" smtClean="0"/>
-              <a:t>jondos</a:t>
-            </a:r>
-            <a:r>
-              <a:rPr lang="en-US" dirty="0" smtClean="0"/>
-              <a:t>, servers, and “attacking” </a:t>
-            </a:r>
-            <a:r>
-              <a:rPr lang="en-US" dirty="0" err="1" smtClean="0"/>
-              <a:t>jondos</a:t>
-            </a:r>
-            <a:endParaRPr lang="en-US" dirty="0" smtClean="0"/>
-          </a:p>
-          <a:p>
-            <a:r>
-              <a:rPr lang="en-US" dirty="0" smtClean="0"/>
-              <a:t>Each of these is scheduled to complete one operation per time step.</a:t>
-            </a:r>
-          </a:p>
-          <a:p>
-            <a:r>
-              <a:rPr lang="en-US" dirty="0" smtClean="0"/>
-              <a:t>One operation may be: initiating a request, forwarding a request, or responding to a request</a:t>
-            </a:r>
-            <a:endParaRPr lang="en-US" dirty="0"/>
-          </a:p>
-        </p:txBody>
-      </p:sp>
+      <mc:AlternateContent xmlns:mc="http://schemas.openxmlformats.org/markup-compatibility/2006">
+        <mc:Choice xmlns:a14="http://schemas.microsoft.com/office/drawing/2010/main" Requires="a14">
+          <p:sp>
+            <p:nvSpPr>
+              <p:cNvPr id="3" name="Content Placeholder 2"/>
+              <p:cNvSpPr>
+                <a:spLocks noGrp="1"/>
+              </p:cNvSpPr>
+              <p:nvPr>
+                <p:ph idx="1"/>
+              </p:nvPr>
+            </p:nvSpPr>
+            <p:spPr/>
+            <p:txBody>
+              <a:bodyPr/>
+              <a:lstStyle/>
+              <a:p>
+                <a:r>
+                  <a:rPr lang="en-US" dirty="0" smtClean="0"/>
+                  <a:t>Given the crowd size, the number of attackers, and the probability of forwarding; Probable Innocence is defined as:</a:t>
+                </a:r>
+              </a:p>
+              <a:p>
+                <a:pPr lvl="1"/>
+                <a14:m>
+                  <m:oMath xmlns:m="http://schemas.openxmlformats.org/officeDocument/2006/math">
+                    <m:r>
+                      <a:rPr lang="en-US" b="0" i="1" smtClean="0">
+                        <a:latin typeface="Cambria Math"/>
+                      </a:rPr>
+                      <m:t>𝑛</m:t>
+                    </m:r>
+                    <m:r>
+                      <a:rPr lang="en-US" b="0" i="1" smtClean="0">
+                        <a:latin typeface="Cambria Math"/>
+                      </a:rPr>
+                      <m:t> −</m:t>
+                    </m:r>
+                    <m:d>
+                      <m:dPr>
+                        <m:ctrlPr>
+                          <a:rPr lang="en-US" b="0" i="1" smtClean="0">
+                            <a:latin typeface="Cambria Math"/>
+                          </a:rPr>
+                        </m:ctrlPr>
+                      </m:dPr>
+                      <m:e>
+                        <m:f>
+                          <m:fPr>
+                            <m:ctrlPr>
+                              <a:rPr lang="en-US" i="1">
+                                <a:latin typeface="Cambria Math"/>
+                              </a:rPr>
+                            </m:ctrlPr>
+                          </m:fPr>
+                          <m:num>
+                            <m:sSub>
+                              <m:sSubPr>
+                                <m:ctrlPr>
+                                  <a:rPr lang="en-US" i="1">
+                                    <a:latin typeface="Cambria Math"/>
+                                  </a:rPr>
+                                </m:ctrlPr>
+                              </m:sSubPr>
+                              <m:e>
+                                <m:r>
+                                  <a:rPr lang="en-US" i="1">
+                                    <a:latin typeface="Cambria Math"/>
+                                  </a:rPr>
+                                  <m:t>𝑝</m:t>
+                                </m:r>
+                              </m:e>
+                              <m:sub>
+                                <m:r>
+                                  <a:rPr lang="en-US" i="1">
+                                    <a:latin typeface="Cambria Math"/>
+                                  </a:rPr>
+                                  <m:t>𝑓</m:t>
+                                </m:r>
+                              </m:sub>
+                            </m:sSub>
+                          </m:num>
+                          <m:den>
+                            <m:sSub>
+                              <m:sSubPr>
+                                <m:ctrlPr>
+                                  <a:rPr lang="en-US" i="1">
+                                    <a:latin typeface="Cambria Math"/>
+                                  </a:rPr>
+                                </m:ctrlPr>
+                              </m:sSubPr>
+                              <m:e>
+                                <m:r>
+                                  <a:rPr lang="en-US" i="1">
+                                    <a:latin typeface="Cambria Math"/>
+                                  </a:rPr>
+                                  <m:t>𝑝</m:t>
+                                </m:r>
+                              </m:e>
+                              <m:sub>
+                                <m:r>
+                                  <a:rPr lang="en-US" i="1">
+                                    <a:latin typeface="Cambria Math"/>
+                                  </a:rPr>
+                                  <m:t>𝑓</m:t>
+                                </m:r>
+                                <m:r>
+                                  <a:rPr lang="en-US" i="1">
+                                    <a:latin typeface="Cambria Math"/>
+                                  </a:rPr>
+                                  <m:t> −0.5</m:t>
+                                </m:r>
+                              </m:sub>
+                            </m:sSub>
+                          </m:den>
+                        </m:f>
+                      </m:e>
+                    </m:d>
+                    <m:r>
+                      <a:rPr lang="en-US" b="0" i="1" smtClean="0">
+                        <a:latin typeface="Cambria Math"/>
+                      </a:rPr>
+                      <m:t>(</m:t>
+                    </m:r>
+                    <m:r>
+                      <a:rPr lang="en-US" b="0" i="1" smtClean="0">
+                        <a:latin typeface="Cambria Math"/>
+                      </a:rPr>
+                      <m:t>𝑐</m:t>
+                    </m:r>
+                    <m:r>
+                      <a:rPr lang="en-US" b="0" i="1" smtClean="0">
+                        <a:latin typeface="Cambria Math"/>
+                      </a:rPr>
+                      <m:t>+1)≥0</m:t>
+                    </m:r>
+                  </m:oMath>
+                </a14:m>
+                <a:endParaRPr lang="en-US" dirty="0"/>
+              </a:p>
+              <a:p>
+                <a:pPr lvl="1"/>
+                <a:endParaRPr lang="en-US" dirty="0" smtClean="0"/>
+              </a:p>
+            </p:txBody>
+          </p:sp>
+        </mc:Choice>
+        <mc:Fallback>
+          <p:sp>
+            <p:nvSpPr>
+              <p:cNvPr id="3" name="Content Placeholder 2"/>
+              <p:cNvSpPr>
+                <a:spLocks noGrp="1" noRot="1" noChangeAspect="1" noMove="1" noResize="1" noEditPoints="1" noAdjustHandles="1" noChangeArrowheads="1" noChangeShapeType="1" noTextEdit="1"/>
+              </p:cNvSpPr>
+              <p:nvPr>
+                <p:ph idx="1"/>
+              </p:nvPr>
+            </p:nvSpPr>
+            <p:spPr>
+              <a:blipFill rotWithShape="1">
+                <a:blip r:embed="rId2"/>
+                <a:stretch>
+                  <a:fillRect l="-408" t="-1752"/>
+                </a:stretch>
+              </a:blipFill>
+            </p:spPr>
+            <p:txBody>
+              <a:bodyPr/>
+              <a:lstStyle/>
+              <a:p>
+                <a:r>
+                  <a:rPr lang="en-US">
+                    <a:noFill/>
+                  </a:rPr>
+                  <a:t> </a:t>
+                </a:r>
+              </a:p>
+            </p:txBody>
+          </p:sp>
+        </mc:Fallback>
+      </mc:AlternateContent>
     </p:spTree>
     <p:extLst>
       <p:ext uri="{BB962C8B-B14F-4D97-AF65-F5344CB8AC3E}">
-        <p14:creationId xmlns:p14="http://schemas.microsoft.com/office/powerpoint/2010/main" val="2563265012"/>
+        <p14:creationId xmlns:p14="http://schemas.microsoft.com/office/powerpoint/2010/main" val="89828850"/>
       </p:ext>
     </p:extLst>
   </p:cSld>
@@ -4489,33 +6429,67 @@
         </p:nvSpPr>
         <p:spPr/>
         <p:txBody>
-          <a:bodyPr/>
-          <a:lstStyle/>
-          <a:p>
-            <a:r>
-              <a:rPr lang="en-US" dirty="0" smtClean="0"/>
-              <a:t>During this simulation, we calculate the following:</a:t>
-            </a:r>
-          </a:p>
-          <a:p>
-            <a:pPr lvl="1"/>
-            <a:r>
-              <a:rPr lang="en-US" dirty="0" smtClean="0"/>
-              <a:t>Response time of messages (including all forwards)</a:t>
-            </a:r>
-          </a:p>
-          <a:p>
-            <a:pPr lvl="1"/>
-            <a:r>
-              <a:rPr lang="en-US" dirty="0" smtClean="0"/>
-              <a:t>Number of forwards</a:t>
-            </a:r>
-          </a:p>
-          <a:p>
-            <a:pPr lvl="1"/>
-            <a:r>
-              <a:rPr lang="en-US" dirty="0" smtClean="0"/>
-              <a:t>Probable innocence</a:t>
+          <a:bodyPr>
+            <a:normAutofit lnSpcReduction="10000"/>
+          </a:bodyPr>
+          <a:lstStyle/>
+          <a:p>
+            <a:r>
+              <a:rPr lang="en-US" dirty="0" smtClean="0"/>
+              <a:t>Designed to compare security and </a:t>
+            </a:r>
+            <a:r>
+              <a:rPr lang="en-US" dirty="0" smtClean="0"/>
+              <a:t>performance</a:t>
+            </a:r>
+          </a:p>
+          <a:p>
+            <a:r>
+              <a:rPr lang="en-US" dirty="0" smtClean="0"/>
+              <a:t>Each simulation is a fixed size (</a:t>
+            </a:r>
+            <a:r>
+              <a:rPr lang="en-US" dirty="0" err="1" smtClean="0"/>
+              <a:t>jondos</a:t>
+            </a:r>
+            <a:r>
+              <a:rPr lang="en-US" dirty="0" smtClean="0"/>
+              <a:t>, attackers, and servers)</a:t>
+            </a:r>
+            <a:endParaRPr lang="en-US" dirty="0" smtClean="0"/>
+          </a:p>
+          <a:p>
+            <a:r>
+              <a:rPr lang="en-US" dirty="0" smtClean="0"/>
+              <a:t>Each </a:t>
+            </a:r>
+            <a:r>
+              <a:rPr lang="en-US" dirty="0" smtClean="0"/>
+              <a:t>of these is scheduled to complete one operation per time step.</a:t>
+            </a:r>
+          </a:p>
+          <a:p>
+            <a:r>
+              <a:rPr lang="en-US" dirty="0" smtClean="0"/>
+              <a:t>One operation may be: </a:t>
+            </a:r>
+            <a:r>
+              <a:rPr lang="en-US" dirty="0" smtClean="0"/>
+              <a:t>forwarding </a:t>
+            </a:r>
+            <a:r>
+              <a:rPr lang="en-US" dirty="0" smtClean="0"/>
+              <a:t>a request, or responding to a </a:t>
+            </a:r>
+            <a:r>
+              <a:rPr lang="en-US" dirty="0" smtClean="0"/>
+              <a:t>request</a:t>
+            </a:r>
+          </a:p>
+          <a:p>
+            <a:r>
+              <a:rPr lang="en-US" dirty="0" smtClean="0"/>
+              <a:t>Requests are initiated randomly</a:t>
             </a:r>
             <a:endParaRPr lang="en-US" dirty="0"/>
           </a:p>
@@ -4524,7 +6498,7 @@
     </p:spTree>
     <p:extLst>
       <p:ext uri="{BB962C8B-B14F-4D97-AF65-F5344CB8AC3E}">
-        <p14:creationId xmlns:p14="http://schemas.microsoft.com/office/powerpoint/2010/main" val="3800184181"/>
+        <p14:creationId xmlns:p14="http://schemas.microsoft.com/office/powerpoint/2010/main" val="2563265012"/>
       </p:ext>
     </p:extLst>
   </p:cSld>
@@ -4575,7 +6549,7 @@
           <a:p>
             <a:r>
               <a:rPr lang="en-US" dirty="0" smtClean="0"/>
-              <a:t>Results</a:t>
+              <a:t>Our Simulation</a:t>
             </a:r>
             <a:endParaRPr lang="en-US" dirty="0"/>
           </a:p>
@@ -4596,14 +6570,39 @@
           <a:bodyPr/>
           <a:lstStyle/>
           <a:p>
-            <a:endParaRPr lang="en-US"/>
+            <a:r>
+              <a:rPr lang="en-US" dirty="0" smtClean="0"/>
+              <a:t>During this simulation, we calculate the following:</a:t>
+            </a:r>
+          </a:p>
+          <a:p>
+            <a:pPr lvl="1"/>
+            <a:r>
+              <a:rPr lang="en-US" dirty="0" smtClean="0"/>
+              <a:t>Response time of messages (including all forwards)</a:t>
+            </a:r>
+          </a:p>
+          <a:p>
+            <a:pPr lvl="1"/>
+            <a:r>
+              <a:rPr lang="en-US" dirty="0" smtClean="0"/>
+              <a:t>Number of forwards</a:t>
+            </a:r>
+          </a:p>
+          <a:p>
+            <a:pPr lvl="1"/>
+            <a:r>
+              <a:rPr lang="en-US" dirty="0" smtClean="0"/>
+              <a:t>Probable innocence</a:t>
+            </a:r>
+            <a:endParaRPr lang="en-US" dirty="0"/>
           </a:p>
         </p:txBody>
       </p:sp>
     </p:spTree>
     <p:extLst>
       <p:ext uri="{BB962C8B-B14F-4D97-AF65-F5344CB8AC3E}">
-        <p14:creationId xmlns:p14="http://schemas.microsoft.com/office/powerpoint/2010/main" val="2541662113"/>
+        <p14:creationId xmlns:p14="http://schemas.microsoft.com/office/powerpoint/2010/main" val="3800184181"/>
       </p:ext>
     </p:extLst>
   </p:cSld>

</xml_diff>